<commit_message>
update plots while drafting V1 manuscript
</commit_message>
<xml_diff>
--- a/Hypothesis.pptx
+++ b/Hypothesis.pptx
@@ -264,7 +264,7 @@
           <a:p>
             <a:fld id="{2AE96F7E-7DAD-D04E-9AD4-C6BDB0D654B4}" type="datetimeFigureOut">
               <a:rPr lang="en-US" smtClean="0"/>
-              <a:t>11/4/23</a:t>
+              <a:t>1/2/24</a:t>
             </a:fld>
             <a:endParaRPr lang="en-US"/>
           </a:p>
@@ -462,7 +462,7 @@
           <a:p>
             <a:fld id="{2AE96F7E-7DAD-D04E-9AD4-C6BDB0D654B4}" type="datetimeFigureOut">
               <a:rPr lang="en-US" smtClean="0"/>
-              <a:t>11/4/23</a:t>
+              <a:t>1/2/24</a:t>
             </a:fld>
             <a:endParaRPr lang="en-US"/>
           </a:p>
@@ -670,7 +670,7 @@
           <a:p>
             <a:fld id="{2AE96F7E-7DAD-D04E-9AD4-C6BDB0D654B4}" type="datetimeFigureOut">
               <a:rPr lang="en-US" smtClean="0"/>
-              <a:t>11/4/23</a:t>
+              <a:t>1/2/24</a:t>
             </a:fld>
             <a:endParaRPr lang="en-US"/>
           </a:p>
@@ -868,7 +868,7 @@
           <a:p>
             <a:fld id="{2AE96F7E-7DAD-D04E-9AD4-C6BDB0D654B4}" type="datetimeFigureOut">
               <a:rPr lang="en-US" smtClean="0"/>
-              <a:t>11/4/23</a:t>
+              <a:t>1/2/24</a:t>
             </a:fld>
             <a:endParaRPr lang="en-US"/>
           </a:p>
@@ -1143,7 +1143,7 @@
           <a:p>
             <a:fld id="{2AE96F7E-7DAD-D04E-9AD4-C6BDB0D654B4}" type="datetimeFigureOut">
               <a:rPr lang="en-US" smtClean="0"/>
-              <a:t>11/4/23</a:t>
+              <a:t>1/2/24</a:t>
             </a:fld>
             <a:endParaRPr lang="en-US"/>
           </a:p>
@@ -1408,7 +1408,7 @@
           <a:p>
             <a:fld id="{2AE96F7E-7DAD-D04E-9AD4-C6BDB0D654B4}" type="datetimeFigureOut">
               <a:rPr lang="en-US" smtClean="0"/>
-              <a:t>11/4/23</a:t>
+              <a:t>1/2/24</a:t>
             </a:fld>
             <a:endParaRPr lang="en-US"/>
           </a:p>
@@ -1820,7 +1820,7 @@
           <a:p>
             <a:fld id="{2AE96F7E-7DAD-D04E-9AD4-C6BDB0D654B4}" type="datetimeFigureOut">
               <a:rPr lang="en-US" smtClean="0"/>
-              <a:t>11/4/23</a:t>
+              <a:t>1/2/24</a:t>
             </a:fld>
             <a:endParaRPr lang="en-US"/>
           </a:p>
@@ -1961,7 +1961,7 @@
           <a:p>
             <a:fld id="{2AE96F7E-7DAD-D04E-9AD4-C6BDB0D654B4}" type="datetimeFigureOut">
               <a:rPr lang="en-US" smtClean="0"/>
-              <a:t>11/4/23</a:t>
+              <a:t>1/2/24</a:t>
             </a:fld>
             <a:endParaRPr lang="en-US"/>
           </a:p>
@@ -2074,7 +2074,7 @@
           <a:p>
             <a:fld id="{2AE96F7E-7DAD-D04E-9AD4-C6BDB0D654B4}" type="datetimeFigureOut">
               <a:rPr lang="en-US" smtClean="0"/>
-              <a:t>11/4/23</a:t>
+              <a:t>1/2/24</a:t>
             </a:fld>
             <a:endParaRPr lang="en-US"/>
           </a:p>
@@ -2385,7 +2385,7 @@
           <a:p>
             <a:fld id="{2AE96F7E-7DAD-D04E-9AD4-C6BDB0D654B4}" type="datetimeFigureOut">
               <a:rPr lang="en-US" smtClean="0"/>
-              <a:t>11/4/23</a:t>
+              <a:t>1/2/24</a:t>
             </a:fld>
             <a:endParaRPr lang="en-US"/>
           </a:p>
@@ -2673,7 +2673,7 @@
           <a:p>
             <a:fld id="{2AE96F7E-7DAD-D04E-9AD4-C6BDB0D654B4}" type="datetimeFigureOut">
               <a:rPr lang="en-US" smtClean="0"/>
-              <a:t>11/4/23</a:t>
+              <a:t>1/2/24</a:t>
             </a:fld>
             <a:endParaRPr lang="en-US"/>
           </a:p>
@@ -2914,7 +2914,7 @@
           <a:p>
             <a:fld id="{2AE96F7E-7DAD-D04E-9AD4-C6BDB0D654B4}" type="datetimeFigureOut">
               <a:rPr lang="en-US" smtClean="0"/>
-              <a:t>11/4/23</a:t>
+              <a:t>1/2/24</a:t>
             </a:fld>
             <a:endParaRPr lang="en-US"/>
           </a:p>
@@ -3331,6 +3331,52 @@
           <a:chExt cx="0" cy="0"/>
         </a:xfrm>
       </p:grpSpPr>
+      <p:cxnSp>
+        <p:nvCxnSpPr>
+          <p:cNvPr id="82" name="Straight Arrow Connector 81">
+            <a:extLst>
+              <a:ext uri="{FF2B5EF4-FFF2-40B4-BE49-F238E27FC236}">
+                <a16:creationId xmlns:a16="http://schemas.microsoft.com/office/drawing/2014/main" id="{EDA27C75-AD1B-CDD7-FD9B-3525B4391486}"/>
+              </a:ext>
+            </a:extLst>
+          </p:cNvPr>
+          <p:cNvCxnSpPr>
+            <a:cxnSpLocks/>
+            <a:endCxn id="4" idx="0"/>
+          </p:cNvCxnSpPr>
+          <p:nvPr/>
+        </p:nvCxnSpPr>
+        <p:spPr>
+          <a:xfrm>
+            <a:off x="1258470" y="4322278"/>
+            <a:ext cx="4578780" cy="1679128"/>
+          </a:xfrm>
+          <a:prstGeom prst="straightConnector1">
+            <a:avLst/>
+          </a:prstGeom>
+          <a:ln w="38100">
+            <a:solidFill>
+              <a:srgbClr val="FF0000"/>
+            </a:solidFill>
+            <a:prstDash val="sysDot"/>
+            <a:tailEnd type="triangle"/>
+          </a:ln>
+        </p:spPr>
+        <p:style>
+          <a:lnRef idx="1">
+            <a:schemeClr val="accent1"/>
+          </a:lnRef>
+          <a:fillRef idx="0">
+            <a:schemeClr val="accent1"/>
+          </a:fillRef>
+          <a:effectRef idx="0">
+            <a:schemeClr val="accent1"/>
+          </a:effectRef>
+          <a:fontRef idx="minor">
+            <a:schemeClr val="tx1"/>
+          </a:fontRef>
+        </p:style>
+      </p:cxnSp>
       <p:sp>
         <p:nvSpPr>
           <p:cNvPr id="4" name="TextBox 3">
@@ -5361,52 +5407,6 @@
           <a:xfrm>
             <a:off x="1294072" y="3187742"/>
             <a:ext cx="0" cy="765416"/>
-          </a:xfrm>
-          <a:prstGeom prst="straightConnector1">
-            <a:avLst/>
-          </a:prstGeom>
-          <a:ln w="38100">
-            <a:solidFill>
-              <a:srgbClr val="FF0000"/>
-            </a:solidFill>
-            <a:prstDash val="sysDot"/>
-            <a:tailEnd type="triangle"/>
-          </a:ln>
-        </p:spPr>
-        <p:style>
-          <a:lnRef idx="1">
-            <a:schemeClr val="accent1"/>
-          </a:lnRef>
-          <a:fillRef idx="0">
-            <a:schemeClr val="accent1"/>
-          </a:fillRef>
-          <a:effectRef idx="0">
-            <a:schemeClr val="accent1"/>
-          </a:effectRef>
-          <a:fontRef idx="minor">
-            <a:schemeClr val="tx1"/>
-          </a:fontRef>
-        </p:style>
-      </p:cxnSp>
-      <p:cxnSp>
-        <p:nvCxnSpPr>
-          <p:cNvPr id="82" name="Straight Arrow Connector 81">
-            <a:extLst>
-              <a:ext uri="{FF2B5EF4-FFF2-40B4-BE49-F238E27FC236}">
-                <a16:creationId xmlns:a16="http://schemas.microsoft.com/office/drawing/2014/main" id="{EDA27C75-AD1B-CDD7-FD9B-3525B4391486}"/>
-              </a:ext>
-            </a:extLst>
-          </p:cNvPr>
-          <p:cNvCxnSpPr>
-            <a:cxnSpLocks/>
-            <a:endCxn id="4" idx="0"/>
-          </p:cNvCxnSpPr>
-          <p:nvPr/>
-        </p:nvCxnSpPr>
-        <p:spPr>
-          <a:xfrm>
-            <a:off x="1258470" y="4322278"/>
-            <a:ext cx="4578780" cy="1679128"/>
           </a:xfrm>
           <a:prstGeom prst="straightConnector1">
             <a:avLst/>
@@ -12680,555 +12680,25 @@
           <a:chExt cx="0" cy="0"/>
         </a:xfrm>
       </p:grpSpPr>
-      <p:sp>
-        <p:nvSpPr>
-          <p:cNvPr id="4" name="TextBox 3">
-            <a:extLst>
-              <a:ext uri="{FF2B5EF4-FFF2-40B4-BE49-F238E27FC236}">
-                <a16:creationId xmlns:a16="http://schemas.microsoft.com/office/drawing/2014/main" id="{C835C669-1AB1-3CB2-D366-E184CF332A6A}"/>
-              </a:ext>
-            </a:extLst>
-          </p:cNvPr>
-          <p:cNvSpPr txBox="1"/>
-          <p:nvPr/>
-        </p:nvSpPr>
-        <p:spPr>
-          <a:xfrm>
-            <a:off x="4761186" y="6001406"/>
-            <a:ext cx="2152128" cy="369332"/>
-          </a:xfrm>
-          <a:prstGeom prst="rect">
-            <a:avLst/>
-          </a:prstGeom>
-          <a:ln w="38100"/>
-        </p:spPr>
-        <p:style>
-          <a:lnRef idx="2">
-            <a:schemeClr val="accent2"/>
-          </a:lnRef>
-          <a:fillRef idx="1">
-            <a:schemeClr val="lt1"/>
-          </a:fillRef>
-          <a:effectRef idx="0">
-            <a:schemeClr val="accent2"/>
-          </a:effectRef>
-          <a:fontRef idx="minor">
-            <a:schemeClr val="dk1"/>
-          </a:fontRef>
-        </p:style>
-        <p:txBody>
-          <a:bodyPr wrap="none" rtlCol="0">
-            <a:spAutoFit/>
-          </a:bodyPr>
-          <a:lstStyle/>
-          <a:p>
-            <a:r>
-              <a:rPr lang="en-US" dirty="0"/>
-              <a:t>Caribou demography</a:t>
-            </a:r>
-          </a:p>
-        </p:txBody>
-      </p:sp>
-      <p:sp>
-        <p:nvSpPr>
-          <p:cNvPr id="5" name="TextBox 4">
-            <a:extLst>
-              <a:ext uri="{FF2B5EF4-FFF2-40B4-BE49-F238E27FC236}">
-                <a16:creationId xmlns:a16="http://schemas.microsoft.com/office/drawing/2014/main" id="{395EF24B-834E-8E29-FAB0-80C7B557BFE4}"/>
-              </a:ext>
-            </a:extLst>
-          </p:cNvPr>
-          <p:cNvSpPr txBox="1"/>
-          <p:nvPr/>
-        </p:nvSpPr>
-        <p:spPr>
-          <a:xfrm>
-            <a:off x="7530081" y="4457417"/>
-            <a:ext cx="1383584" cy="369332"/>
-          </a:xfrm>
-          <a:prstGeom prst="rect">
-            <a:avLst/>
-          </a:prstGeom>
-        </p:spPr>
-        <p:style>
-          <a:lnRef idx="2">
-            <a:schemeClr val="accent2"/>
-          </a:lnRef>
-          <a:fillRef idx="1">
-            <a:schemeClr val="lt1"/>
-          </a:fillRef>
-          <a:effectRef idx="0">
-            <a:schemeClr val="accent2"/>
-          </a:effectRef>
-          <a:fontRef idx="minor">
-            <a:schemeClr val="dk1"/>
-          </a:fontRef>
-        </p:style>
-        <p:txBody>
-          <a:bodyPr wrap="none" rtlCol="0">
-            <a:spAutoFit/>
-          </a:bodyPr>
-          <a:lstStyle/>
-          <a:p>
-            <a:r>
-              <a:rPr lang="en-US" dirty="0"/>
-              <a:t>Primary Prey</a:t>
-            </a:r>
-          </a:p>
-        </p:txBody>
-      </p:sp>
-      <p:sp>
-        <p:nvSpPr>
-          <p:cNvPr id="6" name="TextBox 5">
-            <a:extLst>
-              <a:ext uri="{FF2B5EF4-FFF2-40B4-BE49-F238E27FC236}">
-                <a16:creationId xmlns:a16="http://schemas.microsoft.com/office/drawing/2014/main" id="{9EB21564-0609-9859-BEA3-FA16EAA75741}"/>
-              </a:ext>
-            </a:extLst>
-          </p:cNvPr>
-          <p:cNvSpPr txBox="1"/>
-          <p:nvPr/>
-        </p:nvSpPr>
-        <p:spPr>
-          <a:xfrm>
-            <a:off x="7649737" y="5329163"/>
-            <a:ext cx="1088631" cy="369332"/>
-          </a:xfrm>
-          <a:prstGeom prst="rect">
-            <a:avLst/>
-          </a:prstGeom>
-        </p:spPr>
-        <p:style>
-          <a:lnRef idx="2">
-            <a:schemeClr val="accent2"/>
-          </a:lnRef>
-          <a:fillRef idx="1">
-            <a:schemeClr val="lt1"/>
-          </a:fillRef>
-          <a:effectRef idx="0">
-            <a:schemeClr val="accent2"/>
-          </a:effectRef>
-          <a:fontRef idx="minor">
-            <a:schemeClr val="dk1"/>
-          </a:fontRef>
-        </p:style>
-        <p:txBody>
-          <a:bodyPr wrap="none" rtlCol="0">
-            <a:spAutoFit/>
-          </a:bodyPr>
-          <a:lstStyle/>
-          <a:p>
-            <a:r>
-              <a:rPr lang="en-US" dirty="0"/>
-              <a:t>Predators</a:t>
-            </a:r>
-          </a:p>
-        </p:txBody>
-      </p:sp>
-      <p:sp>
-        <p:nvSpPr>
-          <p:cNvPr id="7" name="TextBox 6">
-            <a:extLst>
-              <a:ext uri="{FF2B5EF4-FFF2-40B4-BE49-F238E27FC236}">
-                <a16:creationId xmlns:a16="http://schemas.microsoft.com/office/drawing/2014/main" id="{3F3D1F03-8CF8-0A8D-7666-94EA01445E36}"/>
-              </a:ext>
-            </a:extLst>
-          </p:cNvPr>
-          <p:cNvSpPr txBox="1"/>
-          <p:nvPr/>
-        </p:nvSpPr>
-        <p:spPr>
-          <a:xfrm>
-            <a:off x="8439664" y="3342209"/>
-            <a:ext cx="2053126" cy="369332"/>
-          </a:xfrm>
-          <a:prstGeom prst="rect">
-            <a:avLst/>
-          </a:prstGeom>
-          <a:ln w="28575"/>
-        </p:spPr>
-        <p:style>
-          <a:lnRef idx="2">
-            <a:schemeClr val="accent2"/>
-          </a:lnRef>
-          <a:fillRef idx="1">
-            <a:schemeClr val="lt1"/>
-          </a:fillRef>
-          <a:effectRef idx="0">
-            <a:schemeClr val="accent2"/>
-          </a:effectRef>
-          <a:fontRef idx="minor">
-            <a:schemeClr val="dk1"/>
-          </a:fontRef>
-        </p:style>
-        <p:txBody>
-          <a:bodyPr wrap="none" rtlCol="0">
-            <a:spAutoFit/>
-          </a:bodyPr>
-          <a:lstStyle/>
-          <a:p>
-            <a:r>
-              <a:rPr lang="en-US" dirty="0"/>
-              <a:t>Habitat Productivity</a:t>
-            </a:r>
-          </a:p>
-        </p:txBody>
-      </p:sp>
-      <p:sp>
-        <p:nvSpPr>
-          <p:cNvPr id="8" name="TextBox 7">
-            <a:extLst>
-              <a:ext uri="{FF2B5EF4-FFF2-40B4-BE49-F238E27FC236}">
-                <a16:creationId xmlns:a16="http://schemas.microsoft.com/office/drawing/2014/main" id="{B8D71637-BCFC-84BA-CCC6-2EEF65CF8CA1}"/>
-              </a:ext>
-            </a:extLst>
-          </p:cNvPr>
-          <p:cNvSpPr txBox="1"/>
-          <p:nvPr/>
-        </p:nvSpPr>
-        <p:spPr>
-          <a:xfrm>
-            <a:off x="9858036" y="2444132"/>
-            <a:ext cx="1318508" cy="646331"/>
-          </a:xfrm>
-          <a:prstGeom prst="rect">
-            <a:avLst/>
-          </a:prstGeom>
-          <a:ln w="38100"/>
-        </p:spPr>
-        <p:style>
-          <a:lnRef idx="2">
-            <a:schemeClr val="accent2"/>
-          </a:lnRef>
-          <a:fillRef idx="1">
-            <a:schemeClr val="lt1"/>
-          </a:fillRef>
-          <a:effectRef idx="0">
-            <a:schemeClr val="accent2"/>
-          </a:effectRef>
-          <a:fontRef idx="minor">
-            <a:schemeClr val="dk1"/>
-          </a:fontRef>
-        </p:style>
-        <p:txBody>
-          <a:bodyPr wrap="square" rtlCol="0">
-            <a:spAutoFit/>
-          </a:bodyPr>
-          <a:lstStyle/>
-          <a:p>
-            <a:r>
-              <a:rPr lang="en-US" dirty="0"/>
-              <a:t>Polygonal disturbance</a:t>
-            </a:r>
-          </a:p>
-        </p:txBody>
-      </p:sp>
-      <p:sp>
-        <p:nvSpPr>
-          <p:cNvPr id="9" name="TextBox 8">
-            <a:extLst>
-              <a:ext uri="{FF2B5EF4-FFF2-40B4-BE49-F238E27FC236}">
-                <a16:creationId xmlns:a16="http://schemas.microsoft.com/office/drawing/2014/main" id="{7B28D9A4-DD32-C823-C419-FB858CBA9549}"/>
-              </a:ext>
-            </a:extLst>
-          </p:cNvPr>
-          <p:cNvSpPr txBox="1"/>
-          <p:nvPr/>
-        </p:nvSpPr>
-        <p:spPr>
-          <a:xfrm>
-            <a:off x="5541260" y="1350929"/>
-            <a:ext cx="910962" cy="646331"/>
-          </a:xfrm>
-          <a:prstGeom prst="rect">
-            <a:avLst/>
-          </a:prstGeom>
-          <a:ln w="38100"/>
-        </p:spPr>
-        <p:style>
-          <a:lnRef idx="2">
-            <a:schemeClr val="accent2"/>
-          </a:lnRef>
-          <a:fillRef idx="1">
-            <a:schemeClr val="lt1"/>
-          </a:fillRef>
-          <a:effectRef idx="0">
-            <a:schemeClr val="accent2"/>
-          </a:effectRef>
-          <a:fontRef idx="minor">
-            <a:schemeClr val="dk1"/>
-          </a:fontRef>
-        </p:style>
-        <p:txBody>
-          <a:bodyPr wrap="square" rtlCol="0">
-            <a:spAutoFit/>
-          </a:bodyPr>
-          <a:lstStyle/>
-          <a:p>
-            <a:r>
-              <a:rPr lang="en-US" dirty="0"/>
-              <a:t>Climate Change</a:t>
-            </a:r>
-          </a:p>
-        </p:txBody>
-      </p:sp>
-      <p:sp>
-        <p:nvSpPr>
-          <p:cNvPr id="10" name="TextBox 9">
-            <a:extLst>
-              <a:ext uri="{FF2B5EF4-FFF2-40B4-BE49-F238E27FC236}">
-                <a16:creationId xmlns:a16="http://schemas.microsoft.com/office/drawing/2014/main" id="{1178127C-A48B-8086-1F9F-47C83A610BEE}"/>
-              </a:ext>
-            </a:extLst>
-          </p:cNvPr>
-          <p:cNvSpPr txBox="1"/>
-          <p:nvPr/>
-        </p:nvSpPr>
-        <p:spPr>
-          <a:xfrm>
-            <a:off x="3235983" y="3932363"/>
-            <a:ext cx="910962" cy="646331"/>
-          </a:xfrm>
-          <a:prstGeom prst="rect">
-            <a:avLst/>
-          </a:prstGeom>
-        </p:spPr>
-        <p:style>
-          <a:lnRef idx="2">
-            <a:schemeClr val="accent2"/>
-          </a:lnRef>
-          <a:fillRef idx="1">
-            <a:schemeClr val="lt1"/>
-          </a:fillRef>
-          <a:effectRef idx="0">
-            <a:schemeClr val="accent2"/>
-          </a:effectRef>
-          <a:fontRef idx="minor">
-            <a:schemeClr val="dk1"/>
-          </a:fontRef>
-        </p:style>
-        <p:txBody>
-          <a:bodyPr wrap="square" rtlCol="0">
-            <a:spAutoFit/>
-          </a:bodyPr>
-          <a:lstStyle/>
-          <a:p>
-            <a:r>
-              <a:rPr lang="en-US" dirty="0"/>
-              <a:t>Access to food</a:t>
-            </a:r>
-          </a:p>
-        </p:txBody>
-      </p:sp>
-      <p:sp>
-        <p:nvSpPr>
-          <p:cNvPr id="12" name="TextBox 11">
-            <a:extLst>
-              <a:ext uri="{FF2B5EF4-FFF2-40B4-BE49-F238E27FC236}">
-                <a16:creationId xmlns:a16="http://schemas.microsoft.com/office/drawing/2014/main" id="{ED182827-550A-91F6-4E86-9F74D25FBBD6}"/>
-              </a:ext>
-            </a:extLst>
-          </p:cNvPr>
-          <p:cNvSpPr txBox="1"/>
-          <p:nvPr/>
-        </p:nvSpPr>
-        <p:spPr>
-          <a:xfrm>
-            <a:off x="3235983" y="2520616"/>
-            <a:ext cx="910962" cy="646331"/>
-          </a:xfrm>
-          <a:prstGeom prst="rect">
-            <a:avLst/>
-          </a:prstGeom>
-          <a:ln w="38100"/>
-        </p:spPr>
-        <p:style>
-          <a:lnRef idx="2">
-            <a:schemeClr val="accent2"/>
-          </a:lnRef>
-          <a:fillRef idx="1">
-            <a:schemeClr val="lt1"/>
-          </a:fillRef>
-          <a:effectRef idx="0">
-            <a:schemeClr val="accent2"/>
-          </a:effectRef>
-          <a:fontRef idx="minor">
-            <a:schemeClr val="dk1"/>
-          </a:fontRef>
-        </p:style>
-        <p:txBody>
-          <a:bodyPr wrap="square" rtlCol="0">
-            <a:spAutoFit/>
-          </a:bodyPr>
-          <a:lstStyle/>
-          <a:p>
-            <a:r>
-              <a:rPr lang="en-US" dirty="0"/>
-              <a:t>Rain on snow</a:t>
-            </a:r>
-          </a:p>
-        </p:txBody>
-      </p:sp>
-      <p:sp>
-        <p:nvSpPr>
-          <p:cNvPr id="13" name="TextBox 12">
-            <a:extLst>
-              <a:ext uri="{FF2B5EF4-FFF2-40B4-BE49-F238E27FC236}">
-                <a16:creationId xmlns:a16="http://schemas.microsoft.com/office/drawing/2014/main" id="{2D1180FD-E63F-3618-3A86-41FF1F7A7DA4}"/>
-              </a:ext>
-            </a:extLst>
-          </p:cNvPr>
-          <p:cNvSpPr txBox="1"/>
-          <p:nvPr/>
-        </p:nvSpPr>
-        <p:spPr>
-          <a:xfrm>
-            <a:off x="4972297" y="2454877"/>
-            <a:ext cx="984535" cy="646331"/>
-          </a:xfrm>
-          <a:prstGeom prst="rect">
-            <a:avLst/>
-          </a:prstGeom>
-          <a:ln w="38100"/>
-        </p:spPr>
-        <p:style>
-          <a:lnRef idx="2">
-            <a:schemeClr val="accent2"/>
-          </a:lnRef>
-          <a:fillRef idx="1">
-            <a:schemeClr val="lt1"/>
-          </a:fillRef>
-          <a:effectRef idx="0">
-            <a:schemeClr val="accent2"/>
-          </a:effectRef>
-          <a:fontRef idx="minor">
-            <a:schemeClr val="dk1"/>
-          </a:fontRef>
-        </p:style>
-        <p:txBody>
-          <a:bodyPr wrap="square" rtlCol="0">
-            <a:spAutoFit/>
-          </a:bodyPr>
-          <a:lstStyle/>
-          <a:p>
-            <a:r>
-              <a:rPr lang="en-US" dirty="0"/>
-              <a:t>Winter Severity</a:t>
-            </a:r>
-          </a:p>
-        </p:txBody>
-      </p:sp>
       <p:cxnSp>
         <p:nvCxnSpPr>
-          <p:cNvPr id="15" name="Straight Arrow Connector 14">
-            <a:extLst>
-              <a:ext uri="{FF2B5EF4-FFF2-40B4-BE49-F238E27FC236}">
-                <a16:creationId xmlns:a16="http://schemas.microsoft.com/office/drawing/2014/main" id="{7B3AFB6C-EC4D-3064-647C-AFCC9024465E}"/>
-              </a:ext>
-            </a:extLst>
-          </p:cNvPr>
-          <p:cNvCxnSpPr>
-            <a:stCxn id="9" idx="2"/>
-            <a:endCxn id="7" idx="0"/>
-          </p:cNvCxnSpPr>
-          <p:nvPr/>
-        </p:nvCxnSpPr>
-        <p:spPr>
-          <a:xfrm>
-            <a:off x="5996741" y="1997260"/>
-            <a:ext cx="3469486" cy="1344949"/>
-          </a:xfrm>
-          <a:prstGeom prst="straightConnector1">
-            <a:avLst/>
-          </a:prstGeom>
-          <a:ln w="38100">
-            <a:solidFill>
-              <a:schemeClr val="accent6"/>
-            </a:solidFill>
-            <a:tailEnd type="triangle"/>
-          </a:ln>
-        </p:spPr>
-        <p:style>
-          <a:lnRef idx="1">
-            <a:schemeClr val="accent1"/>
-          </a:lnRef>
-          <a:fillRef idx="0">
-            <a:schemeClr val="accent1"/>
-          </a:fillRef>
-          <a:effectRef idx="0">
-            <a:schemeClr val="accent1"/>
-          </a:effectRef>
-          <a:fontRef idx="minor">
-            <a:schemeClr val="tx1"/>
-          </a:fontRef>
-        </p:style>
-      </p:cxnSp>
-      <p:cxnSp>
-        <p:nvCxnSpPr>
-          <p:cNvPr id="16" name="Straight Arrow Connector 15">
-            <a:extLst>
-              <a:ext uri="{FF2B5EF4-FFF2-40B4-BE49-F238E27FC236}">
-                <a16:creationId xmlns:a16="http://schemas.microsoft.com/office/drawing/2014/main" id="{35E73242-8458-C349-986D-50E16F1602B6}"/>
+          <p:cNvPr id="82" name="Straight Arrow Connector 81">
+            <a:extLst>
+              <a:ext uri="{FF2B5EF4-FFF2-40B4-BE49-F238E27FC236}">
+                <a16:creationId xmlns:a16="http://schemas.microsoft.com/office/drawing/2014/main" id="{EDA27C75-AD1B-CDD7-FD9B-3525B4391486}"/>
               </a:ext>
             </a:extLst>
           </p:cNvPr>
           <p:cNvCxnSpPr>
             <a:cxnSpLocks/>
-            <a:stCxn id="8" idx="2"/>
-            <a:endCxn id="7" idx="0"/>
+            <a:endCxn id="4" idx="0"/>
           </p:cNvCxnSpPr>
           <p:nvPr/>
         </p:nvCxnSpPr>
         <p:spPr>
-          <a:xfrm flipH="1">
-            <a:off x="9466227" y="3090463"/>
-            <a:ext cx="1051063" cy="251746"/>
-          </a:xfrm>
-          <a:prstGeom prst="straightConnector1">
-            <a:avLst/>
-          </a:prstGeom>
-          <a:ln w="38100">
-            <a:solidFill>
-              <a:schemeClr val="accent6"/>
-            </a:solidFill>
-            <a:tailEnd type="triangle"/>
-          </a:ln>
-        </p:spPr>
-        <p:style>
-          <a:lnRef idx="1">
-            <a:schemeClr val="accent1"/>
-          </a:lnRef>
-          <a:fillRef idx="0">
-            <a:schemeClr val="accent1"/>
-          </a:fillRef>
-          <a:effectRef idx="0">
-            <a:schemeClr val="accent1"/>
-          </a:effectRef>
-          <a:fontRef idx="minor">
-            <a:schemeClr val="tx1"/>
-          </a:fontRef>
-        </p:style>
-      </p:cxnSp>
-      <p:cxnSp>
-        <p:nvCxnSpPr>
-          <p:cNvPr id="18" name="Straight Arrow Connector 17">
-            <a:extLst>
-              <a:ext uri="{FF2B5EF4-FFF2-40B4-BE49-F238E27FC236}">
-                <a16:creationId xmlns:a16="http://schemas.microsoft.com/office/drawing/2014/main" id="{0B5FE794-E23A-270F-A8FE-E6CD7F244ED7}"/>
-              </a:ext>
-            </a:extLst>
-          </p:cNvPr>
-          <p:cNvCxnSpPr>
-            <a:cxnSpLocks/>
-            <a:stCxn id="7" idx="2"/>
-            <a:endCxn id="5" idx="0"/>
-          </p:cNvCxnSpPr>
-          <p:nvPr/>
-        </p:nvCxnSpPr>
-        <p:spPr>
-          <a:xfrm flipH="1">
-            <a:off x="8221873" y="3711541"/>
-            <a:ext cx="1244354" cy="745876"/>
+          <a:xfrm>
+            <a:off x="1258470" y="4322278"/>
+            <a:ext cx="4578780" cy="1679128"/>
           </a:xfrm>
           <a:prstGeom prst="straightConnector1">
             <a:avLst/>
@@ -13256,26 +12726,555 @@
           </a:fontRef>
         </p:style>
       </p:cxnSp>
+      <p:sp>
+        <p:nvSpPr>
+          <p:cNvPr id="4" name="TextBox 3">
+            <a:extLst>
+              <a:ext uri="{FF2B5EF4-FFF2-40B4-BE49-F238E27FC236}">
+                <a16:creationId xmlns:a16="http://schemas.microsoft.com/office/drawing/2014/main" id="{C835C669-1AB1-3CB2-D366-E184CF332A6A}"/>
+              </a:ext>
+            </a:extLst>
+          </p:cNvPr>
+          <p:cNvSpPr txBox="1"/>
+          <p:nvPr/>
+        </p:nvSpPr>
+        <p:spPr>
+          <a:xfrm>
+            <a:off x="4761186" y="6001406"/>
+            <a:ext cx="2152128" cy="369332"/>
+          </a:xfrm>
+          <a:prstGeom prst="rect">
+            <a:avLst/>
+          </a:prstGeom>
+          <a:ln w="38100"/>
+        </p:spPr>
+        <p:style>
+          <a:lnRef idx="2">
+            <a:schemeClr val="accent2"/>
+          </a:lnRef>
+          <a:fillRef idx="1">
+            <a:schemeClr val="lt1"/>
+          </a:fillRef>
+          <a:effectRef idx="0">
+            <a:schemeClr val="accent2"/>
+          </a:effectRef>
+          <a:fontRef idx="minor">
+            <a:schemeClr val="dk1"/>
+          </a:fontRef>
+        </p:style>
+        <p:txBody>
+          <a:bodyPr wrap="none" rtlCol="0">
+            <a:spAutoFit/>
+          </a:bodyPr>
+          <a:lstStyle/>
+          <a:p>
+            <a:r>
+              <a:rPr lang="en-US" dirty="0"/>
+              <a:t>Caribou demography</a:t>
+            </a:r>
+          </a:p>
+        </p:txBody>
+      </p:sp>
+      <p:sp>
+        <p:nvSpPr>
+          <p:cNvPr id="5" name="TextBox 4">
+            <a:extLst>
+              <a:ext uri="{FF2B5EF4-FFF2-40B4-BE49-F238E27FC236}">
+                <a16:creationId xmlns:a16="http://schemas.microsoft.com/office/drawing/2014/main" id="{395EF24B-834E-8E29-FAB0-80C7B557BFE4}"/>
+              </a:ext>
+            </a:extLst>
+          </p:cNvPr>
+          <p:cNvSpPr txBox="1"/>
+          <p:nvPr/>
+        </p:nvSpPr>
+        <p:spPr>
+          <a:xfrm>
+            <a:off x="7530081" y="4457417"/>
+            <a:ext cx="1383584" cy="369332"/>
+          </a:xfrm>
+          <a:prstGeom prst="rect">
+            <a:avLst/>
+          </a:prstGeom>
+        </p:spPr>
+        <p:style>
+          <a:lnRef idx="2">
+            <a:schemeClr val="accent2"/>
+          </a:lnRef>
+          <a:fillRef idx="1">
+            <a:schemeClr val="lt1"/>
+          </a:fillRef>
+          <a:effectRef idx="0">
+            <a:schemeClr val="accent2"/>
+          </a:effectRef>
+          <a:fontRef idx="minor">
+            <a:schemeClr val="dk1"/>
+          </a:fontRef>
+        </p:style>
+        <p:txBody>
+          <a:bodyPr wrap="none" rtlCol="0">
+            <a:spAutoFit/>
+          </a:bodyPr>
+          <a:lstStyle/>
+          <a:p>
+            <a:r>
+              <a:rPr lang="en-US" dirty="0"/>
+              <a:t>Primary Prey</a:t>
+            </a:r>
+          </a:p>
+        </p:txBody>
+      </p:sp>
+      <p:sp>
+        <p:nvSpPr>
+          <p:cNvPr id="6" name="TextBox 5">
+            <a:extLst>
+              <a:ext uri="{FF2B5EF4-FFF2-40B4-BE49-F238E27FC236}">
+                <a16:creationId xmlns:a16="http://schemas.microsoft.com/office/drawing/2014/main" id="{9EB21564-0609-9859-BEA3-FA16EAA75741}"/>
+              </a:ext>
+            </a:extLst>
+          </p:cNvPr>
+          <p:cNvSpPr txBox="1"/>
+          <p:nvPr/>
+        </p:nvSpPr>
+        <p:spPr>
+          <a:xfrm>
+            <a:off x="7649737" y="5329163"/>
+            <a:ext cx="1088631" cy="369332"/>
+          </a:xfrm>
+          <a:prstGeom prst="rect">
+            <a:avLst/>
+          </a:prstGeom>
+        </p:spPr>
+        <p:style>
+          <a:lnRef idx="2">
+            <a:schemeClr val="accent2"/>
+          </a:lnRef>
+          <a:fillRef idx="1">
+            <a:schemeClr val="lt1"/>
+          </a:fillRef>
+          <a:effectRef idx="0">
+            <a:schemeClr val="accent2"/>
+          </a:effectRef>
+          <a:fontRef idx="minor">
+            <a:schemeClr val="dk1"/>
+          </a:fontRef>
+        </p:style>
+        <p:txBody>
+          <a:bodyPr wrap="none" rtlCol="0">
+            <a:spAutoFit/>
+          </a:bodyPr>
+          <a:lstStyle/>
+          <a:p>
+            <a:r>
+              <a:rPr lang="en-US" dirty="0"/>
+              <a:t>Predators</a:t>
+            </a:r>
+          </a:p>
+        </p:txBody>
+      </p:sp>
+      <p:sp>
+        <p:nvSpPr>
+          <p:cNvPr id="7" name="TextBox 6">
+            <a:extLst>
+              <a:ext uri="{FF2B5EF4-FFF2-40B4-BE49-F238E27FC236}">
+                <a16:creationId xmlns:a16="http://schemas.microsoft.com/office/drawing/2014/main" id="{3F3D1F03-8CF8-0A8D-7666-94EA01445E36}"/>
+              </a:ext>
+            </a:extLst>
+          </p:cNvPr>
+          <p:cNvSpPr txBox="1"/>
+          <p:nvPr/>
+        </p:nvSpPr>
+        <p:spPr>
+          <a:xfrm>
+            <a:off x="8439664" y="3342209"/>
+            <a:ext cx="2053126" cy="369332"/>
+          </a:xfrm>
+          <a:prstGeom prst="rect">
+            <a:avLst/>
+          </a:prstGeom>
+          <a:ln w="28575"/>
+        </p:spPr>
+        <p:style>
+          <a:lnRef idx="2">
+            <a:schemeClr val="accent2"/>
+          </a:lnRef>
+          <a:fillRef idx="1">
+            <a:schemeClr val="lt1"/>
+          </a:fillRef>
+          <a:effectRef idx="0">
+            <a:schemeClr val="accent2"/>
+          </a:effectRef>
+          <a:fontRef idx="minor">
+            <a:schemeClr val="dk1"/>
+          </a:fontRef>
+        </p:style>
+        <p:txBody>
+          <a:bodyPr wrap="none" rtlCol="0">
+            <a:spAutoFit/>
+          </a:bodyPr>
+          <a:lstStyle/>
+          <a:p>
+            <a:r>
+              <a:rPr lang="en-US" dirty="0"/>
+              <a:t>Habitat Productivity</a:t>
+            </a:r>
+          </a:p>
+        </p:txBody>
+      </p:sp>
+      <p:sp>
+        <p:nvSpPr>
+          <p:cNvPr id="8" name="TextBox 7">
+            <a:extLst>
+              <a:ext uri="{FF2B5EF4-FFF2-40B4-BE49-F238E27FC236}">
+                <a16:creationId xmlns:a16="http://schemas.microsoft.com/office/drawing/2014/main" id="{B8D71637-BCFC-84BA-CCC6-2EEF65CF8CA1}"/>
+              </a:ext>
+            </a:extLst>
+          </p:cNvPr>
+          <p:cNvSpPr txBox="1"/>
+          <p:nvPr/>
+        </p:nvSpPr>
+        <p:spPr>
+          <a:xfrm>
+            <a:off x="9858036" y="2444132"/>
+            <a:ext cx="1318508" cy="646331"/>
+          </a:xfrm>
+          <a:prstGeom prst="rect">
+            <a:avLst/>
+          </a:prstGeom>
+          <a:ln w="38100"/>
+        </p:spPr>
+        <p:style>
+          <a:lnRef idx="2">
+            <a:schemeClr val="accent2"/>
+          </a:lnRef>
+          <a:fillRef idx="1">
+            <a:schemeClr val="lt1"/>
+          </a:fillRef>
+          <a:effectRef idx="0">
+            <a:schemeClr val="accent2"/>
+          </a:effectRef>
+          <a:fontRef idx="minor">
+            <a:schemeClr val="dk1"/>
+          </a:fontRef>
+        </p:style>
+        <p:txBody>
+          <a:bodyPr wrap="square" rtlCol="0">
+            <a:spAutoFit/>
+          </a:bodyPr>
+          <a:lstStyle/>
+          <a:p>
+            <a:r>
+              <a:rPr lang="en-US" dirty="0"/>
+              <a:t>Polygonal disturbance</a:t>
+            </a:r>
+          </a:p>
+        </p:txBody>
+      </p:sp>
+      <p:sp>
+        <p:nvSpPr>
+          <p:cNvPr id="9" name="TextBox 8">
+            <a:extLst>
+              <a:ext uri="{FF2B5EF4-FFF2-40B4-BE49-F238E27FC236}">
+                <a16:creationId xmlns:a16="http://schemas.microsoft.com/office/drawing/2014/main" id="{7B28D9A4-DD32-C823-C419-FB858CBA9549}"/>
+              </a:ext>
+            </a:extLst>
+          </p:cNvPr>
+          <p:cNvSpPr txBox="1"/>
+          <p:nvPr/>
+        </p:nvSpPr>
+        <p:spPr>
+          <a:xfrm>
+            <a:off x="5541260" y="1350929"/>
+            <a:ext cx="910962" cy="646331"/>
+          </a:xfrm>
+          <a:prstGeom prst="rect">
+            <a:avLst/>
+          </a:prstGeom>
+          <a:ln w="38100"/>
+        </p:spPr>
+        <p:style>
+          <a:lnRef idx="2">
+            <a:schemeClr val="accent2"/>
+          </a:lnRef>
+          <a:fillRef idx="1">
+            <a:schemeClr val="lt1"/>
+          </a:fillRef>
+          <a:effectRef idx="0">
+            <a:schemeClr val="accent2"/>
+          </a:effectRef>
+          <a:fontRef idx="minor">
+            <a:schemeClr val="dk1"/>
+          </a:fontRef>
+        </p:style>
+        <p:txBody>
+          <a:bodyPr wrap="square" rtlCol="0">
+            <a:spAutoFit/>
+          </a:bodyPr>
+          <a:lstStyle/>
+          <a:p>
+            <a:r>
+              <a:rPr lang="en-US" dirty="0"/>
+              <a:t>Climate Change</a:t>
+            </a:r>
+          </a:p>
+        </p:txBody>
+      </p:sp>
+      <p:sp>
+        <p:nvSpPr>
+          <p:cNvPr id="10" name="TextBox 9">
+            <a:extLst>
+              <a:ext uri="{FF2B5EF4-FFF2-40B4-BE49-F238E27FC236}">
+                <a16:creationId xmlns:a16="http://schemas.microsoft.com/office/drawing/2014/main" id="{1178127C-A48B-8086-1F9F-47C83A610BEE}"/>
+              </a:ext>
+            </a:extLst>
+          </p:cNvPr>
+          <p:cNvSpPr txBox="1"/>
+          <p:nvPr/>
+        </p:nvSpPr>
+        <p:spPr>
+          <a:xfrm>
+            <a:off x="3235983" y="3932363"/>
+            <a:ext cx="910962" cy="646331"/>
+          </a:xfrm>
+          <a:prstGeom prst="rect">
+            <a:avLst/>
+          </a:prstGeom>
+        </p:spPr>
+        <p:style>
+          <a:lnRef idx="2">
+            <a:schemeClr val="accent2"/>
+          </a:lnRef>
+          <a:fillRef idx="1">
+            <a:schemeClr val="lt1"/>
+          </a:fillRef>
+          <a:effectRef idx="0">
+            <a:schemeClr val="accent2"/>
+          </a:effectRef>
+          <a:fontRef idx="minor">
+            <a:schemeClr val="dk1"/>
+          </a:fontRef>
+        </p:style>
+        <p:txBody>
+          <a:bodyPr wrap="square" rtlCol="0">
+            <a:spAutoFit/>
+          </a:bodyPr>
+          <a:lstStyle/>
+          <a:p>
+            <a:r>
+              <a:rPr lang="en-US" dirty="0"/>
+              <a:t>Access to food</a:t>
+            </a:r>
+          </a:p>
+        </p:txBody>
+      </p:sp>
+      <p:sp>
+        <p:nvSpPr>
+          <p:cNvPr id="12" name="TextBox 11">
+            <a:extLst>
+              <a:ext uri="{FF2B5EF4-FFF2-40B4-BE49-F238E27FC236}">
+                <a16:creationId xmlns:a16="http://schemas.microsoft.com/office/drawing/2014/main" id="{ED182827-550A-91F6-4E86-9F74D25FBBD6}"/>
+              </a:ext>
+            </a:extLst>
+          </p:cNvPr>
+          <p:cNvSpPr txBox="1"/>
+          <p:nvPr/>
+        </p:nvSpPr>
+        <p:spPr>
+          <a:xfrm>
+            <a:off x="3220848" y="2457825"/>
+            <a:ext cx="910962" cy="646331"/>
+          </a:xfrm>
+          <a:prstGeom prst="rect">
+            <a:avLst/>
+          </a:prstGeom>
+          <a:ln w="38100"/>
+        </p:spPr>
+        <p:style>
+          <a:lnRef idx="2">
+            <a:schemeClr val="accent2"/>
+          </a:lnRef>
+          <a:fillRef idx="1">
+            <a:schemeClr val="lt1"/>
+          </a:fillRef>
+          <a:effectRef idx="0">
+            <a:schemeClr val="accent2"/>
+          </a:effectRef>
+          <a:fontRef idx="minor">
+            <a:schemeClr val="dk1"/>
+          </a:fontRef>
+        </p:style>
+        <p:txBody>
+          <a:bodyPr wrap="square" rtlCol="0">
+            <a:spAutoFit/>
+          </a:bodyPr>
+          <a:lstStyle/>
+          <a:p>
+            <a:r>
+              <a:rPr lang="en-US" dirty="0"/>
+              <a:t>Rain on snow</a:t>
+            </a:r>
+          </a:p>
+        </p:txBody>
+      </p:sp>
+      <p:sp>
+        <p:nvSpPr>
+          <p:cNvPr id="13" name="TextBox 12">
+            <a:extLst>
+              <a:ext uri="{FF2B5EF4-FFF2-40B4-BE49-F238E27FC236}">
+                <a16:creationId xmlns:a16="http://schemas.microsoft.com/office/drawing/2014/main" id="{2D1180FD-E63F-3618-3A86-41FF1F7A7DA4}"/>
+              </a:ext>
+            </a:extLst>
+          </p:cNvPr>
+          <p:cNvSpPr txBox="1"/>
+          <p:nvPr/>
+        </p:nvSpPr>
+        <p:spPr>
+          <a:xfrm>
+            <a:off x="4972297" y="2454877"/>
+            <a:ext cx="984535" cy="646331"/>
+          </a:xfrm>
+          <a:prstGeom prst="rect">
+            <a:avLst/>
+          </a:prstGeom>
+          <a:ln w="38100"/>
+        </p:spPr>
+        <p:style>
+          <a:lnRef idx="2">
+            <a:schemeClr val="accent2"/>
+          </a:lnRef>
+          <a:fillRef idx="1">
+            <a:schemeClr val="lt1"/>
+          </a:fillRef>
+          <a:effectRef idx="0">
+            <a:schemeClr val="accent2"/>
+          </a:effectRef>
+          <a:fontRef idx="minor">
+            <a:schemeClr val="dk1"/>
+          </a:fontRef>
+        </p:style>
+        <p:txBody>
+          <a:bodyPr wrap="square" rtlCol="0">
+            <a:spAutoFit/>
+          </a:bodyPr>
+          <a:lstStyle/>
+          <a:p>
+            <a:r>
+              <a:rPr lang="en-US" dirty="0"/>
+              <a:t>Winter Severity</a:t>
+            </a:r>
+          </a:p>
+        </p:txBody>
+      </p:sp>
       <p:cxnSp>
         <p:nvCxnSpPr>
-          <p:cNvPr id="20" name="Straight Arrow Connector 19">
-            <a:extLst>
-              <a:ext uri="{FF2B5EF4-FFF2-40B4-BE49-F238E27FC236}">
-                <a16:creationId xmlns:a16="http://schemas.microsoft.com/office/drawing/2014/main" id="{69FD6086-6BC1-46E4-055C-17910D0C728A}"/>
+          <p:cNvPr id="15" name="Straight Arrow Connector 14">
+            <a:extLst>
+              <a:ext uri="{FF2B5EF4-FFF2-40B4-BE49-F238E27FC236}">
+                <a16:creationId xmlns:a16="http://schemas.microsoft.com/office/drawing/2014/main" id="{7B3AFB6C-EC4D-3064-647C-AFCC9024465E}"/>
+              </a:ext>
+            </a:extLst>
+          </p:cNvPr>
+          <p:cNvCxnSpPr>
+            <a:stCxn id="9" idx="2"/>
+            <a:endCxn id="7" idx="0"/>
+          </p:cNvCxnSpPr>
+          <p:nvPr/>
+        </p:nvCxnSpPr>
+        <p:spPr>
+          <a:xfrm>
+            <a:off x="5996741" y="1997260"/>
+            <a:ext cx="3469486" cy="1344949"/>
+          </a:xfrm>
+          <a:prstGeom prst="straightConnector1">
+            <a:avLst/>
+          </a:prstGeom>
+          <a:ln w="38100">
+            <a:solidFill>
+              <a:schemeClr val="accent6"/>
+            </a:solidFill>
+            <a:tailEnd type="triangle"/>
+          </a:ln>
+        </p:spPr>
+        <p:style>
+          <a:lnRef idx="1">
+            <a:schemeClr val="accent1"/>
+          </a:lnRef>
+          <a:fillRef idx="0">
+            <a:schemeClr val="accent1"/>
+          </a:fillRef>
+          <a:effectRef idx="0">
+            <a:schemeClr val="accent1"/>
+          </a:effectRef>
+          <a:fontRef idx="minor">
+            <a:schemeClr val="tx1"/>
+          </a:fontRef>
+        </p:style>
+      </p:cxnSp>
+      <p:cxnSp>
+        <p:nvCxnSpPr>
+          <p:cNvPr id="16" name="Straight Arrow Connector 15">
+            <a:extLst>
+              <a:ext uri="{FF2B5EF4-FFF2-40B4-BE49-F238E27FC236}">
+                <a16:creationId xmlns:a16="http://schemas.microsoft.com/office/drawing/2014/main" id="{35E73242-8458-C349-986D-50E16F1602B6}"/>
               </a:ext>
             </a:extLst>
           </p:cNvPr>
           <p:cNvCxnSpPr>
             <a:cxnSpLocks/>
-            <a:stCxn id="5" idx="2"/>
-            <a:endCxn id="6" idx="0"/>
+            <a:stCxn id="8" idx="2"/>
+            <a:endCxn id="7" idx="0"/>
           </p:cNvCxnSpPr>
           <p:nvPr/>
         </p:nvCxnSpPr>
         <p:spPr>
           <a:xfrm flipH="1">
-            <a:off x="8194053" y="4826749"/>
-            <a:ext cx="27820" cy="502414"/>
+            <a:off x="9466227" y="3090463"/>
+            <a:ext cx="1051063" cy="251746"/>
+          </a:xfrm>
+          <a:prstGeom prst="straightConnector1">
+            <a:avLst/>
+          </a:prstGeom>
+          <a:ln w="38100">
+            <a:solidFill>
+              <a:schemeClr val="accent6"/>
+            </a:solidFill>
+            <a:tailEnd type="triangle"/>
+          </a:ln>
+        </p:spPr>
+        <p:style>
+          <a:lnRef idx="1">
+            <a:schemeClr val="accent1"/>
+          </a:lnRef>
+          <a:fillRef idx="0">
+            <a:schemeClr val="accent1"/>
+          </a:fillRef>
+          <a:effectRef idx="0">
+            <a:schemeClr val="accent1"/>
+          </a:effectRef>
+          <a:fontRef idx="minor">
+            <a:schemeClr val="tx1"/>
+          </a:fontRef>
+        </p:style>
+      </p:cxnSp>
+      <p:cxnSp>
+        <p:nvCxnSpPr>
+          <p:cNvPr id="18" name="Straight Arrow Connector 17">
+            <a:extLst>
+              <a:ext uri="{FF2B5EF4-FFF2-40B4-BE49-F238E27FC236}">
+                <a16:creationId xmlns:a16="http://schemas.microsoft.com/office/drawing/2014/main" id="{0B5FE794-E23A-270F-A8FE-E6CD7F244ED7}"/>
+              </a:ext>
+            </a:extLst>
+          </p:cNvPr>
+          <p:cNvCxnSpPr>
+            <a:cxnSpLocks/>
+            <a:stCxn id="7" idx="2"/>
+            <a:endCxn id="5" idx="0"/>
+          </p:cNvCxnSpPr>
+          <p:nvPr/>
+        </p:nvCxnSpPr>
+        <p:spPr>
+          <a:xfrm flipH="1">
+            <a:off x="8221873" y="3711541"/>
+            <a:ext cx="1244354" cy="745876"/>
           </a:xfrm>
           <a:prstGeom prst="straightConnector1">
             <a:avLst/>
@@ -13305,6 +13304,53 @@
       </p:cxnSp>
       <p:cxnSp>
         <p:nvCxnSpPr>
+          <p:cNvPr id="20" name="Straight Arrow Connector 19">
+            <a:extLst>
+              <a:ext uri="{FF2B5EF4-FFF2-40B4-BE49-F238E27FC236}">
+                <a16:creationId xmlns:a16="http://schemas.microsoft.com/office/drawing/2014/main" id="{69FD6086-6BC1-46E4-055C-17910D0C728A}"/>
+              </a:ext>
+            </a:extLst>
+          </p:cNvPr>
+          <p:cNvCxnSpPr>
+            <a:cxnSpLocks/>
+            <a:stCxn id="5" idx="2"/>
+            <a:endCxn id="6" idx="0"/>
+          </p:cNvCxnSpPr>
+          <p:nvPr/>
+        </p:nvCxnSpPr>
+        <p:spPr>
+          <a:xfrm flipH="1">
+            <a:off x="8194053" y="4826749"/>
+            <a:ext cx="27820" cy="502414"/>
+          </a:xfrm>
+          <a:prstGeom prst="straightConnector1">
+            <a:avLst/>
+          </a:prstGeom>
+          <a:ln w="38100">
+            <a:solidFill>
+              <a:schemeClr val="accent6"/>
+            </a:solidFill>
+            <a:prstDash val="sysDot"/>
+            <a:tailEnd type="triangle"/>
+          </a:ln>
+        </p:spPr>
+        <p:style>
+          <a:lnRef idx="1">
+            <a:schemeClr val="accent1"/>
+          </a:lnRef>
+          <a:fillRef idx="0">
+            <a:schemeClr val="accent1"/>
+          </a:fillRef>
+          <a:effectRef idx="0">
+            <a:schemeClr val="accent1"/>
+          </a:effectRef>
+          <a:fontRef idx="minor">
+            <a:schemeClr val="tx1"/>
+          </a:fontRef>
+        </p:style>
+      </p:cxnSp>
+      <p:cxnSp>
+        <p:nvCxnSpPr>
           <p:cNvPr id="22" name="Straight Arrow Connector 21">
             <a:extLst>
               <a:ext uri="{FF2B5EF4-FFF2-40B4-BE49-F238E27FC236}">
@@ -13414,8 +13460,8 @@
         </p:nvCxnSpPr>
         <p:spPr>
           <a:xfrm flipH="1">
-            <a:off x="3691464" y="1674095"/>
-            <a:ext cx="1849796" cy="846521"/>
+            <a:off x="3676329" y="1674095"/>
+            <a:ext cx="1864931" cy="783730"/>
           </a:xfrm>
           <a:prstGeom prst="straightConnector1">
             <a:avLst/>
@@ -13507,8 +13553,8 @@
         </p:nvCxnSpPr>
         <p:spPr>
           <a:xfrm>
-            <a:off x="3691464" y="3166947"/>
-            <a:ext cx="0" cy="765416"/>
+            <a:off x="3676329" y="3104156"/>
+            <a:ext cx="15135" cy="828207"/>
           </a:xfrm>
           <a:prstGeom prst="straightConnector1">
             <a:avLst/>
@@ -13770,8 +13816,8 @@
         </p:nvCxnSpPr>
         <p:spPr>
           <a:xfrm flipV="1">
-            <a:off x="178946" y="284661"/>
-            <a:ext cx="698078" cy="4263"/>
+            <a:off x="780397" y="239685"/>
+            <a:ext cx="704483" cy="6395"/>
           </a:xfrm>
           <a:prstGeom prst="straightConnector1">
             <a:avLst/>
@@ -13814,8 +13860,8 @@
         </p:nvCxnSpPr>
         <p:spPr>
           <a:xfrm flipV="1">
-            <a:off x="178946" y="758938"/>
-            <a:ext cx="698078" cy="4263"/>
+            <a:off x="780397" y="713962"/>
+            <a:ext cx="704483" cy="6395"/>
           </a:xfrm>
           <a:prstGeom prst="straightConnector1">
             <a:avLst/>
@@ -13858,8 +13904,8 @@
         </p:nvCxnSpPr>
         <p:spPr>
           <a:xfrm flipV="1">
-            <a:off x="178946" y="1185098"/>
-            <a:ext cx="698078" cy="4263"/>
+            <a:off x="780397" y="1140122"/>
+            <a:ext cx="704483" cy="6395"/>
           </a:xfrm>
           <a:prstGeom prst="straightConnector1">
             <a:avLst/>
@@ -13903,8 +13949,8 @@
         </p:nvSpPr>
         <p:spPr>
           <a:xfrm>
-            <a:off x="971617" y="99995"/>
-            <a:ext cx="1499834" cy="369332"/>
+            <a:off x="1573068" y="57151"/>
+            <a:ext cx="1513596" cy="369332"/>
           </a:xfrm>
           <a:prstGeom prst="rect">
             <a:avLst/>
@@ -13912,7 +13958,7 @@
           <a:noFill/>
         </p:spPr>
         <p:txBody>
-          <a:bodyPr wrap="none" rtlCol="0">
+          <a:bodyPr wrap="square" rtlCol="0">
             <a:spAutoFit/>
           </a:bodyPr>
           <a:lstStyle/>
@@ -13938,8 +13984,8 @@
         </p:nvSpPr>
         <p:spPr>
           <a:xfrm>
-            <a:off x="971617" y="584614"/>
-            <a:ext cx="1599027" cy="369332"/>
+            <a:off x="1573068" y="541770"/>
+            <a:ext cx="1613699" cy="369332"/>
           </a:xfrm>
           <a:prstGeom prst="rect">
             <a:avLst/>
@@ -13947,7 +13993,7 @@
           <a:noFill/>
         </p:spPr>
         <p:txBody>
-          <a:bodyPr wrap="none" rtlCol="0">
+          <a:bodyPr wrap="square" rtlCol="0">
             <a:spAutoFit/>
           </a:bodyPr>
           <a:lstStyle/>
@@ -13973,8 +14019,8 @@
         </p:nvSpPr>
         <p:spPr>
           <a:xfrm>
-            <a:off x="964808" y="977847"/>
-            <a:ext cx="4492127" cy="923330"/>
+            <a:off x="1566260" y="935003"/>
+            <a:ext cx="1933314" cy="923330"/>
           </a:xfrm>
           <a:prstGeom prst="rect">
             <a:avLst/>
@@ -13982,26 +14028,14 @@
           <a:noFill/>
         </p:spPr>
         <p:txBody>
-          <a:bodyPr wrap="none" rtlCol="0">
+          <a:bodyPr wrap="square" rtlCol="0">
             <a:spAutoFit/>
           </a:bodyPr>
           <a:lstStyle/>
           <a:p>
             <a:r>
               <a:rPr lang="en-US" dirty="0"/>
-              <a:t>Won’t be directly measured due to no data</a:t>
-            </a:r>
-          </a:p>
-          <a:p>
-            <a:r>
-              <a:rPr lang="en-US" dirty="0"/>
-              <a:t>Connections will skip from last measured data</a:t>
-            </a:r>
-          </a:p>
-          <a:p>
-            <a:r>
-              <a:rPr lang="en-US" dirty="0"/>
-              <a:t>Straight to caribou demography</a:t>
+              <a:t>Not directly assessed due to data limitations</a:t>
             </a:r>
           </a:p>
         </p:txBody>
@@ -14072,8 +14106,8 @@
         </p:nvCxnSpPr>
         <p:spPr>
           <a:xfrm>
-            <a:off x="3691464" y="3166947"/>
-            <a:ext cx="2173605" cy="1043980"/>
+            <a:off x="3676329" y="3104156"/>
+            <a:ext cx="2188740" cy="1106771"/>
           </a:xfrm>
           <a:prstGeom prst="straightConnector1">
             <a:avLst/>
@@ -14162,8 +14196,8 @@
         </p:nvSpPr>
         <p:spPr>
           <a:xfrm>
-            <a:off x="2904016" y="108177"/>
-            <a:ext cx="184731" cy="369332"/>
+            <a:off x="3374386" y="137179"/>
+            <a:ext cx="186426" cy="369332"/>
           </a:xfrm>
           <a:prstGeom prst="rect">
             <a:avLst/>
@@ -14185,7 +14219,7 @@
           </a:fontRef>
         </p:style>
         <p:txBody>
-          <a:bodyPr wrap="none" rtlCol="0">
+          <a:bodyPr wrap="square" rtlCol="0">
             <a:spAutoFit/>
           </a:bodyPr>
           <a:lstStyle/>
@@ -14208,8 +14242,8 @@
         </p:nvSpPr>
         <p:spPr>
           <a:xfrm>
-            <a:off x="3235983" y="98809"/>
-            <a:ext cx="1121013" cy="369332"/>
+            <a:off x="3706353" y="127811"/>
+            <a:ext cx="1131299" cy="369332"/>
           </a:xfrm>
           <a:prstGeom prst="rect">
             <a:avLst/>
@@ -14217,7 +14251,7 @@
           <a:noFill/>
         </p:spPr>
         <p:txBody>
-          <a:bodyPr wrap="none" rtlCol="0">
+          <a:bodyPr wrap="square" rtlCol="0">
             <a:spAutoFit/>
           </a:bodyPr>
           <a:lstStyle/>
@@ -14243,8 +14277,8 @@
         </p:nvSpPr>
         <p:spPr>
           <a:xfrm>
-            <a:off x="2898122" y="584614"/>
-            <a:ext cx="184731" cy="369332"/>
+            <a:off x="3368492" y="613616"/>
+            <a:ext cx="186426" cy="369332"/>
           </a:xfrm>
           <a:prstGeom prst="rect">
             <a:avLst/>
@@ -14266,7 +14300,7 @@
           </a:fontRef>
         </p:style>
         <p:txBody>
-          <a:bodyPr wrap="none" rtlCol="0">
+          <a:bodyPr wrap="square" rtlCol="0">
             <a:spAutoFit/>
           </a:bodyPr>
           <a:lstStyle/>
@@ -14289,8 +14323,8 @@
         </p:nvSpPr>
         <p:spPr>
           <a:xfrm>
-            <a:off x="3230089" y="575246"/>
-            <a:ext cx="923523" cy="369332"/>
+            <a:off x="3700459" y="604248"/>
+            <a:ext cx="931997" cy="369332"/>
           </a:xfrm>
           <a:prstGeom prst="rect">
             <a:avLst/>
@@ -14298,7 +14332,7 @@
           <a:noFill/>
         </p:spPr>
         <p:txBody>
-          <a:bodyPr wrap="none" rtlCol="0">
+          <a:bodyPr wrap="square" rtlCol="0">
             <a:spAutoFit/>
           </a:bodyPr>
           <a:lstStyle/>
@@ -14375,7 +14409,7 @@
         </p:nvSpPr>
         <p:spPr>
           <a:xfrm>
-            <a:off x="2095173" y="2512147"/>
+            <a:off x="2080038" y="2449356"/>
             <a:ext cx="910962" cy="646331"/>
           </a:xfrm>
           <a:prstGeom prst="rect">
@@ -14424,7 +14458,7 @@
         </p:nvSpPr>
         <p:spPr>
           <a:xfrm>
-            <a:off x="744040" y="2520615"/>
+            <a:off x="728905" y="2457824"/>
             <a:ext cx="1144161" cy="646331"/>
           </a:xfrm>
           <a:prstGeom prst="rect">
@@ -14477,8 +14511,8 @@
         </p:nvCxnSpPr>
         <p:spPr>
           <a:xfrm flipH="1">
-            <a:off x="2550654" y="1674095"/>
-            <a:ext cx="2990606" cy="838052"/>
+            <a:off x="2535519" y="1674095"/>
+            <a:ext cx="3005741" cy="775261"/>
           </a:xfrm>
           <a:prstGeom prst="straightConnector1">
             <a:avLst/>
@@ -14523,8 +14557,8 @@
         </p:nvCxnSpPr>
         <p:spPr>
           <a:xfrm flipH="1">
-            <a:off x="1316121" y="1674095"/>
-            <a:ext cx="4225139" cy="846520"/>
+            <a:off x="1300986" y="1674095"/>
+            <a:ext cx="4240274" cy="783729"/>
           </a:xfrm>
           <a:prstGeom prst="straightConnector1">
             <a:avLst/>
@@ -14739,10 +14773,10 @@
       </p:cxnSp>
       <p:cxnSp>
         <p:nvCxnSpPr>
-          <p:cNvPr id="82" name="Straight Arrow Connector 81">
-            <a:extLst>
-              <a:ext uri="{FF2B5EF4-FFF2-40B4-BE49-F238E27FC236}">
-                <a16:creationId xmlns:a16="http://schemas.microsoft.com/office/drawing/2014/main" id="{EDA27C75-AD1B-CDD7-FD9B-3525B4391486}"/>
+          <p:cNvPr id="84" name="Straight Arrow Connector 83">
+            <a:extLst>
+              <a:ext uri="{FF2B5EF4-FFF2-40B4-BE49-F238E27FC236}">
+                <a16:creationId xmlns:a16="http://schemas.microsoft.com/office/drawing/2014/main" id="{06342CB9-6AC0-B9B8-AC4C-46102294496E}"/>
               </a:ext>
             </a:extLst>
           </p:cNvPr>
@@ -14754,8 +14788,8 @@
         </p:nvCxnSpPr>
         <p:spPr>
           <a:xfrm>
-            <a:off x="1258470" y="4322278"/>
-            <a:ext cx="4578780" cy="1679128"/>
+            <a:off x="2995429" y="4591181"/>
+            <a:ext cx="2841821" cy="1410225"/>
           </a:xfrm>
           <a:prstGeom prst="straightConnector1">
             <a:avLst/>
@@ -14783,52 +14817,6 @@
           </a:fontRef>
         </p:style>
       </p:cxnSp>
-      <p:cxnSp>
-        <p:nvCxnSpPr>
-          <p:cNvPr id="84" name="Straight Arrow Connector 83">
-            <a:extLst>
-              <a:ext uri="{FF2B5EF4-FFF2-40B4-BE49-F238E27FC236}">
-                <a16:creationId xmlns:a16="http://schemas.microsoft.com/office/drawing/2014/main" id="{06342CB9-6AC0-B9B8-AC4C-46102294496E}"/>
-              </a:ext>
-            </a:extLst>
-          </p:cNvPr>
-          <p:cNvCxnSpPr>
-            <a:cxnSpLocks/>
-            <a:endCxn id="4" idx="0"/>
-          </p:cNvCxnSpPr>
-          <p:nvPr/>
-        </p:nvCxnSpPr>
-        <p:spPr>
-          <a:xfrm>
-            <a:off x="2995429" y="4591181"/>
-            <a:ext cx="2841821" cy="1410225"/>
-          </a:xfrm>
-          <a:prstGeom prst="straightConnector1">
-            <a:avLst/>
-          </a:prstGeom>
-          <a:ln w="38100">
-            <a:solidFill>
-              <a:srgbClr val="FF0000"/>
-            </a:solidFill>
-            <a:prstDash val="sysDot"/>
-            <a:tailEnd type="triangle"/>
-          </a:ln>
-        </p:spPr>
-        <p:style>
-          <a:lnRef idx="1">
-            <a:schemeClr val="accent1"/>
-          </a:lnRef>
-          <a:fillRef idx="0">
-            <a:schemeClr val="accent1"/>
-          </a:fillRef>
-          <a:effectRef idx="0">
-            <a:schemeClr val="accent1"/>
-          </a:effectRef>
-          <a:fontRef idx="minor">
-            <a:schemeClr val="tx1"/>
-          </a:fontRef>
-        </p:style>
-      </p:cxnSp>
       <p:sp>
         <p:nvSpPr>
           <p:cNvPr id="86" name="Rectangle 85">
@@ -15212,8 +15200,8 @@
         </p:nvSpPr>
         <p:spPr>
           <a:xfrm>
-            <a:off x="10253548" y="3788912"/>
-            <a:ext cx="1318508" cy="707886"/>
+            <a:off x="10253547" y="3788912"/>
+            <a:ext cx="1633923" cy="830997"/>
           </a:xfrm>
           <a:prstGeom prst="rect">
             <a:avLst/>
@@ -15227,15 +15215,15 @@
           <a:lstStyle/>
           <a:p>
             <a:r>
-              <a:rPr lang="en-US" sz="1000" dirty="0"/>
+              <a:rPr lang="en-US" sz="1200" dirty="0"/>
               <a:t>*limited temporal period and </a:t>
             </a:r>
             <a:r>
-              <a:rPr lang="en-US" sz="1000" dirty="0" err="1"/>
+              <a:rPr lang="en-US" sz="1200" dirty="0" err="1"/>
               <a:t>ndvi</a:t>
             </a:r>
             <a:r>
-              <a:rPr lang="en-US" sz="1000" dirty="0"/>
+              <a:rPr lang="en-US" sz="1200" dirty="0"/>
               <a:t> applicability across herds is questionable</a:t>
             </a:r>
           </a:p>
@@ -15259,8 +15247,8 @@
         </p:nvCxnSpPr>
         <p:spPr>
           <a:xfrm rot="16200000" flipV="1">
-            <a:off x="10571778" y="3447888"/>
-            <a:ext cx="262037" cy="420012"/>
+            <a:off x="10650632" y="3369034"/>
+            <a:ext cx="262037" cy="577719"/>
           </a:xfrm>
           <a:prstGeom prst="curvedConnector2">
             <a:avLst/>
@@ -15298,8 +15286,8 @@
         </p:nvSpPr>
         <p:spPr>
           <a:xfrm>
-            <a:off x="6669899" y="1102565"/>
-            <a:ext cx="1318508" cy="400110"/>
+            <a:off x="6596182" y="1051004"/>
+            <a:ext cx="1318508" cy="461665"/>
           </a:xfrm>
           <a:prstGeom prst="rect">
             <a:avLst/>
@@ -15313,7 +15301,7 @@
           <a:lstStyle/>
           <a:p>
             <a:r>
-              <a:rPr lang="en-US" sz="1000" dirty="0"/>
+              <a:rPr lang="en-US" sz="1200" dirty="0"/>
               <a:t>Have static but not temporal data</a:t>
             </a:r>
           </a:p>
@@ -15337,8 +15325,8 @@
         </p:nvCxnSpPr>
         <p:spPr>
           <a:xfrm rot="16200000" flipH="1">
-            <a:off x="7287981" y="1543847"/>
-            <a:ext cx="344660" cy="262316"/>
+            <a:off x="7256119" y="1511985"/>
+            <a:ext cx="334666" cy="336033"/>
           </a:xfrm>
           <a:prstGeom prst="curvedConnector2">
             <a:avLst/>
@@ -15362,6 +15350,54 @@
           </a:fontRef>
         </p:style>
       </p:cxnSp>
+      <p:sp>
+        <p:nvSpPr>
+          <p:cNvPr id="25" name="TextBox 24">
+            <a:extLst>
+              <a:ext uri="{FF2B5EF4-FFF2-40B4-BE49-F238E27FC236}">
+                <a16:creationId xmlns:a16="http://schemas.microsoft.com/office/drawing/2014/main" id="{4F75D408-0F28-9481-90BF-31669017A5B3}"/>
+              </a:ext>
+            </a:extLst>
+          </p:cNvPr>
+          <p:cNvSpPr txBox="1"/>
+          <p:nvPr/>
+        </p:nvSpPr>
+        <p:spPr>
+          <a:xfrm>
+            <a:off x="124396" y="50308"/>
+            <a:ext cx="362600" cy="461665"/>
+          </a:xfrm>
+          <a:prstGeom prst="rect">
+            <a:avLst/>
+          </a:prstGeom>
+        </p:spPr>
+        <p:style>
+          <a:lnRef idx="2">
+            <a:schemeClr val="dk1"/>
+          </a:lnRef>
+          <a:fillRef idx="1">
+            <a:schemeClr val="lt1"/>
+          </a:fillRef>
+          <a:effectRef idx="0">
+            <a:schemeClr val="dk1"/>
+          </a:effectRef>
+          <a:fontRef idx="minor">
+            <a:schemeClr val="dk1"/>
+          </a:fontRef>
+        </p:style>
+        <p:txBody>
+          <a:bodyPr wrap="none" rtlCol="0">
+            <a:spAutoFit/>
+          </a:bodyPr>
+          <a:lstStyle/>
+          <a:p>
+            <a:r>
+              <a:rPr lang="en-US" sz="2400" dirty="0"/>
+              <a:t>A</a:t>
+            </a:r>
+          </a:p>
+        </p:txBody>
+      </p:sp>
     </p:spTree>
     <p:extLst>
       <p:ext uri="{BB962C8B-B14F-4D97-AF65-F5344CB8AC3E}">
@@ -15392,555 +15428,25 @@
           <a:chExt cx="0" cy="0"/>
         </a:xfrm>
       </p:grpSpPr>
-      <p:sp>
-        <p:nvSpPr>
-          <p:cNvPr id="4" name="TextBox 3">
-            <a:extLst>
-              <a:ext uri="{FF2B5EF4-FFF2-40B4-BE49-F238E27FC236}">
-                <a16:creationId xmlns:a16="http://schemas.microsoft.com/office/drawing/2014/main" id="{C835C669-1AB1-3CB2-D366-E184CF332A6A}"/>
-              </a:ext>
-            </a:extLst>
-          </p:cNvPr>
-          <p:cNvSpPr txBox="1"/>
-          <p:nvPr/>
-        </p:nvSpPr>
-        <p:spPr>
-          <a:xfrm>
-            <a:off x="4761186" y="6001406"/>
-            <a:ext cx="2152128" cy="369332"/>
-          </a:xfrm>
-          <a:prstGeom prst="rect">
-            <a:avLst/>
-          </a:prstGeom>
-          <a:ln w="38100"/>
-        </p:spPr>
-        <p:style>
-          <a:lnRef idx="2">
-            <a:schemeClr val="accent2"/>
-          </a:lnRef>
-          <a:fillRef idx="1">
-            <a:schemeClr val="lt1"/>
-          </a:fillRef>
-          <a:effectRef idx="0">
-            <a:schemeClr val="accent2"/>
-          </a:effectRef>
-          <a:fontRef idx="minor">
-            <a:schemeClr val="dk1"/>
-          </a:fontRef>
-        </p:style>
-        <p:txBody>
-          <a:bodyPr wrap="none" rtlCol="0">
-            <a:spAutoFit/>
-          </a:bodyPr>
-          <a:lstStyle/>
-          <a:p>
-            <a:r>
-              <a:rPr lang="en-US" dirty="0"/>
-              <a:t>Caribou demography</a:t>
-            </a:r>
-          </a:p>
-        </p:txBody>
-      </p:sp>
-      <p:sp>
-        <p:nvSpPr>
-          <p:cNvPr id="5" name="TextBox 4">
-            <a:extLst>
-              <a:ext uri="{FF2B5EF4-FFF2-40B4-BE49-F238E27FC236}">
-                <a16:creationId xmlns:a16="http://schemas.microsoft.com/office/drawing/2014/main" id="{395EF24B-834E-8E29-FAB0-80C7B557BFE4}"/>
-              </a:ext>
-            </a:extLst>
-          </p:cNvPr>
-          <p:cNvSpPr txBox="1"/>
-          <p:nvPr/>
-        </p:nvSpPr>
-        <p:spPr>
-          <a:xfrm>
-            <a:off x="7530081" y="4457417"/>
-            <a:ext cx="1383584" cy="369332"/>
-          </a:xfrm>
-          <a:prstGeom prst="rect">
-            <a:avLst/>
-          </a:prstGeom>
-        </p:spPr>
-        <p:style>
-          <a:lnRef idx="2">
-            <a:schemeClr val="accent2"/>
-          </a:lnRef>
-          <a:fillRef idx="1">
-            <a:schemeClr val="lt1"/>
-          </a:fillRef>
-          <a:effectRef idx="0">
-            <a:schemeClr val="accent2"/>
-          </a:effectRef>
-          <a:fontRef idx="minor">
-            <a:schemeClr val="dk1"/>
-          </a:fontRef>
-        </p:style>
-        <p:txBody>
-          <a:bodyPr wrap="none" rtlCol="0">
-            <a:spAutoFit/>
-          </a:bodyPr>
-          <a:lstStyle/>
-          <a:p>
-            <a:r>
-              <a:rPr lang="en-US" dirty="0"/>
-              <a:t>Primary Prey</a:t>
-            </a:r>
-          </a:p>
-        </p:txBody>
-      </p:sp>
-      <p:sp>
-        <p:nvSpPr>
-          <p:cNvPr id="6" name="TextBox 5">
-            <a:extLst>
-              <a:ext uri="{FF2B5EF4-FFF2-40B4-BE49-F238E27FC236}">
-                <a16:creationId xmlns:a16="http://schemas.microsoft.com/office/drawing/2014/main" id="{9EB21564-0609-9859-BEA3-FA16EAA75741}"/>
-              </a:ext>
-            </a:extLst>
-          </p:cNvPr>
-          <p:cNvSpPr txBox="1"/>
-          <p:nvPr/>
-        </p:nvSpPr>
-        <p:spPr>
-          <a:xfrm>
-            <a:off x="7649737" y="5329163"/>
-            <a:ext cx="1088631" cy="369332"/>
-          </a:xfrm>
-          <a:prstGeom prst="rect">
-            <a:avLst/>
-          </a:prstGeom>
-        </p:spPr>
-        <p:style>
-          <a:lnRef idx="2">
-            <a:schemeClr val="accent2"/>
-          </a:lnRef>
-          <a:fillRef idx="1">
-            <a:schemeClr val="lt1"/>
-          </a:fillRef>
-          <a:effectRef idx="0">
-            <a:schemeClr val="accent2"/>
-          </a:effectRef>
-          <a:fontRef idx="minor">
-            <a:schemeClr val="dk1"/>
-          </a:fontRef>
-        </p:style>
-        <p:txBody>
-          <a:bodyPr wrap="none" rtlCol="0">
-            <a:spAutoFit/>
-          </a:bodyPr>
-          <a:lstStyle/>
-          <a:p>
-            <a:r>
-              <a:rPr lang="en-US" dirty="0"/>
-              <a:t>Predators</a:t>
-            </a:r>
-          </a:p>
-        </p:txBody>
-      </p:sp>
-      <p:sp>
-        <p:nvSpPr>
-          <p:cNvPr id="7" name="TextBox 6">
-            <a:extLst>
-              <a:ext uri="{FF2B5EF4-FFF2-40B4-BE49-F238E27FC236}">
-                <a16:creationId xmlns:a16="http://schemas.microsoft.com/office/drawing/2014/main" id="{3F3D1F03-8CF8-0A8D-7666-94EA01445E36}"/>
-              </a:ext>
-            </a:extLst>
-          </p:cNvPr>
-          <p:cNvSpPr txBox="1"/>
-          <p:nvPr/>
-        </p:nvSpPr>
-        <p:spPr>
-          <a:xfrm>
-            <a:off x="8439664" y="3342209"/>
-            <a:ext cx="2053126" cy="369332"/>
-          </a:xfrm>
-          <a:prstGeom prst="rect">
-            <a:avLst/>
-          </a:prstGeom>
-          <a:ln w="28575"/>
-        </p:spPr>
-        <p:style>
-          <a:lnRef idx="2">
-            <a:schemeClr val="accent2"/>
-          </a:lnRef>
-          <a:fillRef idx="1">
-            <a:schemeClr val="lt1"/>
-          </a:fillRef>
-          <a:effectRef idx="0">
-            <a:schemeClr val="accent2"/>
-          </a:effectRef>
-          <a:fontRef idx="minor">
-            <a:schemeClr val="dk1"/>
-          </a:fontRef>
-        </p:style>
-        <p:txBody>
-          <a:bodyPr wrap="none" rtlCol="0">
-            <a:spAutoFit/>
-          </a:bodyPr>
-          <a:lstStyle/>
-          <a:p>
-            <a:r>
-              <a:rPr lang="en-US" dirty="0"/>
-              <a:t>Habitat Productivity</a:t>
-            </a:r>
-          </a:p>
-        </p:txBody>
-      </p:sp>
-      <p:sp>
-        <p:nvSpPr>
-          <p:cNvPr id="8" name="TextBox 7">
-            <a:extLst>
-              <a:ext uri="{FF2B5EF4-FFF2-40B4-BE49-F238E27FC236}">
-                <a16:creationId xmlns:a16="http://schemas.microsoft.com/office/drawing/2014/main" id="{B8D71637-BCFC-84BA-CCC6-2EEF65CF8CA1}"/>
-              </a:ext>
-            </a:extLst>
-          </p:cNvPr>
-          <p:cNvSpPr txBox="1"/>
-          <p:nvPr/>
-        </p:nvSpPr>
-        <p:spPr>
-          <a:xfrm>
-            <a:off x="9858036" y="2444132"/>
-            <a:ext cx="1318508" cy="646331"/>
-          </a:xfrm>
-          <a:prstGeom prst="rect">
-            <a:avLst/>
-          </a:prstGeom>
-          <a:ln w="38100"/>
-        </p:spPr>
-        <p:style>
-          <a:lnRef idx="2">
-            <a:schemeClr val="accent2"/>
-          </a:lnRef>
-          <a:fillRef idx="1">
-            <a:schemeClr val="lt1"/>
-          </a:fillRef>
-          <a:effectRef idx="0">
-            <a:schemeClr val="accent2"/>
-          </a:effectRef>
-          <a:fontRef idx="minor">
-            <a:schemeClr val="dk1"/>
-          </a:fontRef>
-        </p:style>
-        <p:txBody>
-          <a:bodyPr wrap="square" rtlCol="0">
-            <a:spAutoFit/>
-          </a:bodyPr>
-          <a:lstStyle/>
-          <a:p>
-            <a:r>
-              <a:rPr lang="en-US" dirty="0"/>
-              <a:t>Polygonal disturbance</a:t>
-            </a:r>
-          </a:p>
-        </p:txBody>
-      </p:sp>
-      <p:sp>
-        <p:nvSpPr>
-          <p:cNvPr id="9" name="TextBox 8">
-            <a:extLst>
-              <a:ext uri="{FF2B5EF4-FFF2-40B4-BE49-F238E27FC236}">
-                <a16:creationId xmlns:a16="http://schemas.microsoft.com/office/drawing/2014/main" id="{7B28D9A4-DD32-C823-C419-FB858CBA9549}"/>
-              </a:ext>
-            </a:extLst>
-          </p:cNvPr>
-          <p:cNvSpPr txBox="1"/>
-          <p:nvPr/>
-        </p:nvSpPr>
-        <p:spPr>
-          <a:xfrm>
-            <a:off x="5541260" y="1350929"/>
-            <a:ext cx="910962" cy="646331"/>
-          </a:xfrm>
-          <a:prstGeom prst="rect">
-            <a:avLst/>
-          </a:prstGeom>
-          <a:ln w="38100"/>
-        </p:spPr>
-        <p:style>
-          <a:lnRef idx="2">
-            <a:schemeClr val="accent2"/>
-          </a:lnRef>
-          <a:fillRef idx="1">
-            <a:schemeClr val="lt1"/>
-          </a:fillRef>
-          <a:effectRef idx="0">
-            <a:schemeClr val="accent2"/>
-          </a:effectRef>
-          <a:fontRef idx="minor">
-            <a:schemeClr val="dk1"/>
-          </a:fontRef>
-        </p:style>
-        <p:txBody>
-          <a:bodyPr wrap="square" rtlCol="0">
-            <a:spAutoFit/>
-          </a:bodyPr>
-          <a:lstStyle/>
-          <a:p>
-            <a:r>
-              <a:rPr lang="en-US" dirty="0"/>
-              <a:t>Climate Change</a:t>
-            </a:r>
-          </a:p>
-        </p:txBody>
-      </p:sp>
-      <p:sp>
-        <p:nvSpPr>
-          <p:cNvPr id="10" name="TextBox 9">
-            <a:extLst>
-              <a:ext uri="{FF2B5EF4-FFF2-40B4-BE49-F238E27FC236}">
-                <a16:creationId xmlns:a16="http://schemas.microsoft.com/office/drawing/2014/main" id="{1178127C-A48B-8086-1F9F-47C83A610BEE}"/>
-              </a:ext>
-            </a:extLst>
-          </p:cNvPr>
-          <p:cNvSpPr txBox="1"/>
-          <p:nvPr/>
-        </p:nvSpPr>
-        <p:spPr>
-          <a:xfrm>
-            <a:off x="3235983" y="3932363"/>
-            <a:ext cx="910962" cy="646331"/>
-          </a:xfrm>
-          <a:prstGeom prst="rect">
-            <a:avLst/>
-          </a:prstGeom>
-        </p:spPr>
-        <p:style>
-          <a:lnRef idx="2">
-            <a:schemeClr val="accent2"/>
-          </a:lnRef>
-          <a:fillRef idx="1">
-            <a:schemeClr val="lt1"/>
-          </a:fillRef>
-          <a:effectRef idx="0">
-            <a:schemeClr val="accent2"/>
-          </a:effectRef>
-          <a:fontRef idx="minor">
-            <a:schemeClr val="dk1"/>
-          </a:fontRef>
-        </p:style>
-        <p:txBody>
-          <a:bodyPr wrap="square" rtlCol="0">
-            <a:spAutoFit/>
-          </a:bodyPr>
-          <a:lstStyle/>
-          <a:p>
-            <a:r>
-              <a:rPr lang="en-US" dirty="0"/>
-              <a:t>Access to food</a:t>
-            </a:r>
-          </a:p>
-        </p:txBody>
-      </p:sp>
-      <p:sp>
-        <p:nvSpPr>
-          <p:cNvPr id="12" name="TextBox 11">
-            <a:extLst>
-              <a:ext uri="{FF2B5EF4-FFF2-40B4-BE49-F238E27FC236}">
-                <a16:creationId xmlns:a16="http://schemas.microsoft.com/office/drawing/2014/main" id="{ED182827-550A-91F6-4E86-9F74D25FBBD6}"/>
-              </a:ext>
-            </a:extLst>
-          </p:cNvPr>
-          <p:cNvSpPr txBox="1"/>
-          <p:nvPr/>
-        </p:nvSpPr>
-        <p:spPr>
-          <a:xfrm>
-            <a:off x="3235983" y="2458687"/>
-            <a:ext cx="910962" cy="646331"/>
-          </a:xfrm>
-          <a:prstGeom prst="rect">
-            <a:avLst/>
-          </a:prstGeom>
-          <a:ln w="38100"/>
-        </p:spPr>
-        <p:style>
-          <a:lnRef idx="2">
-            <a:schemeClr val="accent2"/>
-          </a:lnRef>
-          <a:fillRef idx="1">
-            <a:schemeClr val="lt1"/>
-          </a:fillRef>
-          <a:effectRef idx="0">
-            <a:schemeClr val="accent2"/>
-          </a:effectRef>
-          <a:fontRef idx="minor">
-            <a:schemeClr val="dk1"/>
-          </a:fontRef>
-        </p:style>
-        <p:txBody>
-          <a:bodyPr wrap="square" rtlCol="0">
-            <a:spAutoFit/>
-          </a:bodyPr>
-          <a:lstStyle/>
-          <a:p>
-            <a:r>
-              <a:rPr lang="en-US" dirty="0"/>
-              <a:t>Rain on snow</a:t>
-            </a:r>
-          </a:p>
-        </p:txBody>
-      </p:sp>
-      <p:sp>
-        <p:nvSpPr>
-          <p:cNvPr id="13" name="TextBox 12">
-            <a:extLst>
-              <a:ext uri="{FF2B5EF4-FFF2-40B4-BE49-F238E27FC236}">
-                <a16:creationId xmlns:a16="http://schemas.microsoft.com/office/drawing/2014/main" id="{2D1180FD-E63F-3618-3A86-41FF1F7A7DA4}"/>
-              </a:ext>
-            </a:extLst>
-          </p:cNvPr>
-          <p:cNvSpPr txBox="1"/>
-          <p:nvPr/>
-        </p:nvSpPr>
-        <p:spPr>
-          <a:xfrm>
-            <a:off x="4972297" y="2454877"/>
-            <a:ext cx="984535" cy="646331"/>
-          </a:xfrm>
-          <a:prstGeom prst="rect">
-            <a:avLst/>
-          </a:prstGeom>
-          <a:ln w="38100"/>
-        </p:spPr>
-        <p:style>
-          <a:lnRef idx="2">
-            <a:schemeClr val="accent2"/>
-          </a:lnRef>
-          <a:fillRef idx="1">
-            <a:schemeClr val="lt1"/>
-          </a:fillRef>
-          <a:effectRef idx="0">
-            <a:schemeClr val="accent2"/>
-          </a:effectRef>
-          <a:fontRef idx="minor">
-            <a:schemeClr val="dk1"/>
-          </a:fontRef>
-        </p:style>
-        <p:txBody>
-          <a:bodyPr wrap="square" rtlCol="0">
-            <a:spAutoFit/>
-          </a:bodyPr>
-          <a:lstStyle/>
-          <a:p>
-            <a:r>
-              <a:rPr lang="en-US" dirty="0"/>
-              <a:t>Winter Severity</a:t>
-            </a:r>
-          </a:p>
-        </p:txBody>
-      </p:sp>
       <p:cxnSp>
         <p:nvCxnSpPr>
-          <p:cNvPr id="15" name="Straight Arrow Connector 14">
-            <a:extLst>
-              <a:ext uri="{FF2B5EF4-FFF2-40B4-BE49-F238E27FC236}">
-                <a16:creationId xmlns:a16="http://schemas.microsoft.com/office/drawing/2014/main" id="{7B3AFB6C-EC4D-3064-647C-AFCC9024465E}"/>
-              </a:ext>
-            </a:extLst>
-          </p:cNvPr>
-          <p:cNvCxnSpPr>
-            <a:stCxn id="9" idx="2"/>
-            <a:endCxn id="7" idx="0"/>
-          </p:cNvCxnSpPr>
-          <p:nvPr/>
-        </p:nvCxnSpPr>
-        <p:spPr>
-          <a:xfrm>
-            <a:off x="5996741" y="1997260"/>
-            <a:ext cx="3469486" cy="1344949"/>
-          </a:xfrm>
-          <a:prstGeom prst="straightConnector1">
-            <a:avLst/>
-          </a:prstGeom>
-          <a:ln w="38100">
-            <a:solidFill>
-              <a:schemeClr val="accent6"/>
-            </a:solidFill>
-            <a:tailEnd type="triangle"/>
-          </a:ln>
-        </p:spPr>
-        <p:style>
-          <a:lnRef idx="1">
-            <a:schemeClr val="accent1"/>
-          </a:lnRef>
-          <a:fillRef idx="0">
-            <a:schemeClr val="accent1"/>
-          </a:fillRef>
-          <a:effectRef idx="0">
-            <a:schemeClr val="accent1"/>
-          </a:effectRef>
-          <a:fontRef idx="minor">
-            <a:schemeClr val="tx1"/>
-          </a:fontRef>
-        </p:style>
-      </p:cxnSp>
-      <p:cxnSp>
-        <p:nvCxnSpPr>
-          <p:cNvPr id="16" name="Straight Arrow Connector 15">
-            <a:extLst>
-              <a:ext uri="{FF2B5EF4-FFF2-40B4-BE49-F238E27FC236}">
-                <a16:creationId xmlns:a16="http://schemas.microsoft.com/office/drawing/2014/main" id="{35E73242-8458-C349-986D-50E16F1602B6}"/>
+          <p:cNvPr id="82" name="Straight Arrow Connector 81">
+            <a:extLst>
+              <a:ext uri="{FF2B5EF4-FFF2-40B4-BE49-F238E27FC236}">
+                <a16:creationId xmlns:a16="http://schemas.microsoft.com/office/drawing/2014/main" id="{EDA27C75-AD1B-CDD7-FD9B-3525B4391486}"/>
               </a:ext>
             </a:extLst>
           </p:cNvPr>
           <p:cNvCxnSpPr>
             <a:cxnSpLocks/>
-            <a:stCxn id="8" idx="2"/>
-            <a:endCxn id="7" idx="0"/>
+            <a:endCxn id="4" idx="0"/>
           </p:cNvCxnSpPr>
           <p:nvPr/>
         </p:nvCxnSpPr>
         <p:spPr>
-          <a:xfrm flipH="1">
-            <a:off x="9466227" y="3090463"/>
-            <a:ext cx="1051063" cy="251746"/>
-          </a:xfrm>
-          <a:prstGeom prst="straightConnector1">
-            <a:avLst/>
-          </a:prstGeom>
-          <a:ln w="38100">
-            <a:solidFill>
-              <a:schemeClr val="accent6"/>
-            </a:solidFill>
-            <a:tailEnd type="triangle"/>
-          </a:ln>
-        </p:spPr>
-        <p:style>
-          <a:lnRef idx="1">
-            <a:schemeClr val="accent1"/>
-          </a:lnRef>
-          <a:fillRef idx="0">
-            <a:schemeClr val="accent1"/>
-          </a:fillRef>
-          <a:effectRef idx="0">
-            <a:schemeClr val="accent1"/>
-          </a:effectRef>
-          <a:fontRef idx="minor">
-            <a:schemeClr val="tx1"/>
-          </a:fontRef>
-        </p:style>
-      </p:cxnSp>
-      <p:cxnSp>
-        <p:nvCxnSpPr>
-          <p:cNvPr id="18" name="Straight Arrow Connector 17">
-            <a:extLst>
-              <a:ext uri="{FF2B5EF4-FFF2-40B4-BE49-F238E27FC236}">
-                <a16:creationId xmlns:a16="http://schemas.microsoft.com/office/drawing/2014/main" id="{0B5FE794-E23A-270F-A8FE-E6CD7F244ED7}"/>
-              </a:ext>
-            </a:extLst>
-          </p:cNvPr>
-          <p:cNvCxnSpPr>
-            <a:cxnSpLocks/>
-            <a:stCxn id="7" idx="2"/>
-            <a:endCxn id="5" idx="0"/>
-          </p:cNvCxnSpPr>
-          <p:nvPr/>
-        </p:nvCxnSpPr>
-        <p:spPr>
-          <a:xfrm flipH="1">
-            <a:off x="8221873" y="3711541"/>
-            <a:ext cx="1244354" cy="745876"/>
+          <a:xfrm>
+            <a:off x="1258470" y="4322278"/>
+            <a:ext cx="4578780" cy="1679128"/>
           </a:xfrm>
           <a:prstGeom prst="straightConnector1">
             <a:avLst/>
@@ -15968,26 +15474,555 @@
           </a:fontRef>
         </p:style>
       </p:cxnSp>
+      <p:sp>
+        <p:nvSpPr>
+          <p:cNvPr id="4" name="TextBox 3">
+            <a:extLst>
+              <a:ext uri="{FF2B5EF4-FFF2-40B4-BE49-F238E27FC236}">
+                <a16:creationId xmlns:a16="http://schemas.microsoft.com/office/drawing/2014/main" id="{C835C669-1AB1-3CB2-D366-E184CF332A6A}"/>
+              </a:ext>
+            </a:extLst>
+          </p:cNvPr>
+          <p:cNvSpPr txBox="1"/>
+          <p:nvPr/>
+        </p:nvSpPr>
+        <p:spPr>
+          <a:xfrm>
+            <a:off x="4761186" y="6001406"/>
+            <a:ext cx="2152128" cy="369332"/>
+          </a:xfrm>
+          <a:prstGeom prst="rect">
+            <a:avLst/>
+          </a:prstGeom>
+          <a:ln w="38100"/>
+        </p:spPr>
+        <p:style>
+          <a:lnRef idx="2">
+            <a:schemeClr val="accent2"/>
+          </a:lnRef>
+          <a:fillRef idx="1">
+            <a:schemeClr val="lt1"/>
+          </a:fillRef>
+          <a:effectRef idx="0">
+            <a:schemeClr val="accent2"/>
+          </a:effectRef>
+          <a:fontRef idx="minor">
+            <a:schemeClr val="dk1"/>
+          </a:fontRef>
+        </p:style>
+        <p:txBody>
+          <a:bodyPr wrap="none" rtlCol="0">
+            <a:spAutoFit/>
+          </a:bodyPr>
+          <a:lstStyle/>
+          <a:p>
+            <a:r>
+              <a:rPr lang="en-US" dirty="0"/>
+              <a:t>Caribou demography</a:t>
+            </a:r>
+          </a:p>
+        </p:txBody>
+      </p:sp>
+      <p:sp>
+        <p:nvSpPr>
+          <p:cNvPr id="5" name="TextBox 4">
+            <a:extLst>
+              <a:ext uri="{FF2B5EF4-FFF2-40B4-BE49-F238E27FC236}">
+                <a16:creationId xmlns:a16="http://schemas.microsoft.com/office/drawing/2014/main" id="{395EF24B-834E-8E29-FAB0-80C7B557BFE4}"/>
+              </a:ext>
+            </a:extLst>
+          </p:cNvPr>
+          <p:cNvSpPr txBox="1"/>
+          <p:nvPr/>
+        </p:nvSpPr>
+        <p:spPr>
+          <a:xfrm>
+            <a:off x="7530081" y="4457417"/>
+            <a:ext cx="1383584" cy="369332"/>
+          </a:xfrm>
+          <a:prstGeom prst="rect">
+            <a:avLst/>
+          </a:prstGeom>
+        </p:spPr>
+        <p:style>
+          <a:lnRef idx="2">
+            <a:schemeClr val="accent2"/>
+          </a:lnRef>
+          <a:fillRef idx="1">
+            <a:schemeClr val="lt1"/>
+          </a:fillRef>
+          <a:effectRef idx="0">
+            <a:schemeClr val="accent2"/>
+          </a:effectRef>
+          <a:fontRef idx="minor">
+            <a:schemeClr val="dk1"/>
+          </a:fontRef>
+        </p:style>
+        <p:txBody>
+          <a:bodyPr wrap="none" rtlCol="0">
+            <a:spAutoFit/>
+          </a:bodyPr>
+          <a:lstStyle/>
+          <a:p>
+            <a:r>
+              <a:rPr lang="en-US" dirty="0"/>
+              <a:t>Primary Prey</a:t>
+            </a:r>
+          </a:p>
+        </p:txBody>
+      </p:sp>
+      <p:sp>
+        <p:nvSpPr>
+          <p:cNvPr id="6" name="TextBox 5">
+            <a:extLst>
+              <a:ext uri="{FF2B5EF4-FFF2-40B4-BE49-F238E27FC236}">
+                <a16:creationId xmlns:a16="http://schemas.microsoft.com/office/drawing/2014/main" id="{9EB21564-0609-9859-BEA3-FA16EAA75741}"/>
+              </a:ext>
+            </a:extLst>
+          </p:cNvPr>
+          <p:cNvSpPr txBox="1"/>
+          <p:nvPr/>
+        </p:nvSpPr>
+        <p:spPr>
+          <a:xfrm>
+            <a:off x="7649737" y="5329163"/>
+            <a:ext cx="1088631" cy="369332"/>
+          </a:xfrm>
+          <a:prstGeom prst="rect">
+            <a:avLst/>
+          </a:prstGeom>
+        </p:spPr>
+        <p:style>
+          <a:lnRef idx="2">
+            <a:schemeClr val="accent2"/>
+          </a:lnRef>
+          <a:fillRef idx="1">
+            <a:schemeClr val="lt1"/>
+          </a:fillRef>
+          <a:effectRef idx="0">
+            <a:schemeClr val="accent2"/>
+          </a:effectRef>
+          <a:fontRef idx="minor">
+            <a:schemeClr val="dk1"/>
+          </a:fontRef>
+        </p:style>
+        <p:txBody>
+          <a:bodyPr wrap="none" rtlCol="0">
+            <a:spAutoFit/>
+          </a:bodyPr>
+          <a:lstStyle/>
+          <a:p>
+            <a:r>
+              <a:rPr lang="en-US" dirty="0"/>
+              <a:t>Predators</a:t>
+            </a:r>
+          </a:p>
+        </p:txBody>
+      </p:sp>
+      <p:sp>
+        <p:nvSpPr>
+          <p:cNvPr id="7" name="TextBox 6">
+            <a:extLst>
+              <a:ext uri="{FF2B5EF4-FFF2-40B4-BE49-F238E27FC236}">
+                <a16:creationId xmlns:a16="http://schemas.microsoft.com/office/drawing/2014/main" id="{3F3D1F03-8CF8-0A8D-7666-94EA01445E36}"/>
+              </a:ext>
+            </a:extLst>
+          </p:cNvPr>
+          <p:cNvSpPr txBox="1"/>
+          <p:nvPr/>
+        </p:nvSpPr>
+        <p:spPr>
+          <a:xfrm>
+            <a:off x="8439664" y="3342209"/>
+            <a:ext cx="2053126" cy="369332"/>
+          </a:xfrm>
+          <a:prstGeom prst="rect">
+            <a:avLst/>
+          </a:prstGeom>
+          <a:ln w="28575"/>
+        </p:spPr>
+        <p:style>
+          <a:lnRef idx="2">
+            <a:schemeClr val="accent2"/>
+          </a:lnRef>
+          <a:fillRef idx="1">
+            <a:schemeClr val="lt1"/>
+          </a:fillRef>
+          <a:effectRef idx="0">
+            <a:schemeClr val="accent2"/>
+          </a:effectRef>
+          <a:fontRef idx="minor">
+            <a:schemeClr val="dk1"/>
+          </a:fontRef>
+        </p:style>
+        <p:txBody>
+          <a:bodyPr wrap="none" rtlCol="0">
+            <a:spAutoFit/>
+          </a:bodyPr>
+          <a:lstStyle/>
+          <a:p>
+            <a:r>
+              <a:rPr lang="en-US" dirty="0"/>
+              <a:t>Habitat Productivity</a:t>
+            </a:r>
+          </a:p>
+        </p:txBody>
+      </p:sp>
+      <p:sp>
+        <p:nvSpPr>
+          <p:cNvPr id="8" name="TextBox 7">
+            <a:extLst>
+              <a:ext uri="{FF2B5EF4-FFF2-40B4-BE49-F238E27FC236}">
+                <a16:creationId xmlns:a16="http://schemas.microsoft.com/office/drawing/2014/main" id="{B8D71637-BCFC-84BA-CCC6-2EEF65CF8CA1}"/>
+              </a:ext>
+            </a:extLst>
+          </p:cNvPr>
+          <p:cNvSpPr txBox="1"/>
+          <p:nvPr/>
+        </p:nvSpPr>
+        <p:spPr>
+          <a:xfrm>
+            <a:off x="9858036" y="2444132"/>
+            <a:ext cx="1318508" cy="646331"/>
+          </a:xfrm>
+          <a:prstGeom prst="rect">
+            <a:avLst/>
+          </a:prstGeom>
+          <a:ln w="38100"/>
+        </p:spPr>
+        <p:style>
+          <a:lnRef idx="2">
+            <a:schemeClr val="accent2"/>
+          </a:lnRef>
+          <a:fillRef idx="1">
+            <a:schemeClr val="lt1"/>
+          </a:fillRef>
+          <a:effectRef idx="0">
+            <a:schemeClr val="accent2"/>
+          </a:effectRef>
+          <a:fontRef idx="minor">
+            <a:schemeClr val="dk1"/>
+          </a:fontRef>
+        </p:style>
+        <p:txBody>
+          <a:bodyPr wrap="square" rtlCol="0">
+            <a:spAutoFit/>
+          </a:bodyPr>
+          <a:lstStyle/>
+          <a:p>
+            <a:r>
+              <a:rPr lang="en-US" dirty="0"/>
+              <a:t>Polygonal disturbance</a:t>
+            </a:r>
+          </a:p>
+        </p:txBody>
+      </p:sp>
+      <p:sp>
+        <p:nvSpPr>
+          <p:cNvPr id="9" name="TextBox 8">
+            <a:extLst>
+              <a:ext uri="{FF2B5EF4-FFF2-40B4-BE49-F238E27FC236}">
+                <a16:creationId xmlns:a16="http://schemas.microsoft.com/office/drawing/2014/main" id="{7B28D9A4-DD32-C823-C419-FB858CBA9549}"/>
+              </a:ext>
+            </a:extLst>
+          </p:cNvPr>
+          <p:cNvSpPr txBox="1"/>
+          <p:nvPr/>
+        </p:nvSpPr>
+        <p:spPr>
+          <a:xfrm>
+            <a:off x="5541260" y="1350929"/>
+            <a:ext cx="910962" cy="646331"/>
+          </a:xfrm>
+          <a:prstGeom prst="rect">
+            <a:avLst/>
+          </a:prstGeom>
+          <a:ln w="38100"/>
+        </p:spPr>
+        <p:style>
+          <a:lnRef idx="2">
+            <a:schemeClr val="accent2"/>
+          </a:lnRef>
+          <a:fillRef idx="1">
+            <a:schemeClr val="lt1"/>
+          </a:fillRef>
+          <a:effectRef idx="0">
+            <a:schemeClr val="accent2"/>
+          </a:effectRef>
+          <a:fontRef idx="minor">
+            <a:schemeClr val="dk1"/>
+          </a:fontRef>
+        </p:style>
+        <p:txBody>
+          <a:bodyPr wrap="square" rtlCol="0">
+            <a:spAutoFit/>
+          </a:bodyPr>
+          <a:lstStyle/>
+          <a:p>
+            <a:r>
+              <a:rPr lang="en-US" dirty="0"/>
+              <a:t>Climate Change</a:t>
+            </a:r>
+          </a:p>
+        </p:txBody>
+      </p:sp>
+      <p:sp>
+        <p:nvSpPr>
+          <p:cNvPr id="10" name="TextBox 9">
+            <a:extLst>
+              <a:ext uri="{FF2B5EF4-FFF2-40B4-BE49-F238E27FC236}">
+                <a16:creationId xmlns:a16="http://schemas.microsoft.com/office/drawing/2014/main" id="{1178127C-A48B-8086-1F9F-47C83A610BEE}"/>
+              </a:ext>
+            </a:extLst>
+          </p:cNvPr>
+          <p:cNvSpPr txBox="1"/>
+          <p:nvPr/>
+        </p:nvSpPr>
+        <p:spPr>
+          <a:xfrm>
+            <a:off x="3235983" y="3932363"/>
+            <a:ext cx="910962" cy="646331"/>
+          </a:xfrm>
+          <a:prstGeom prst="rect">
+            <a:avLst/>
+          </a:prstGeom>
+        </p:spPr>
+        <p:style>
+          <a:lnRef idx="2">
+            <a:schemeClr val="accent2"/>
+          </a:lnRef>
+          <a:fillRef idx="1">
+            <a:schemeClr val="lt1"/>
+          </a:fillRef>
+          <a:effectRef idx="0">
+            <a:schemeClr val="accent2"/>
+          </a:effectRef>
+          <a:fontRef idx="minor">
+            <a:schemeClr val="dk1"/>
+          </a:fontRef>
+        </p:style>
+        <p:txBody>
+          <a:bodyPr wrap="square" rtlCol="0">
+            <a:spAutoFit/>
+          </a:bodyPr>
+          <a:lstStyle/>
+          <a:p>
+            <a:r>
+              <a:rPr lang="en-US" dirty="0"/>
+              <a:t>Access to food</a:t>
+            </a:r>
+          </a:p>
+        </p:txBody>
+      </p:sp>
+      <p:sp>
+        <p:nvSpPr>
+          <p:cNvPr id="12" name="TextBox 11">
+            <a:extLst>
+              <a:ext uri="{FF2B5EF4-FFF2-40B4-BE49-F238E27FC236}">
+                <a16:creationId xmlns:a16="http://schemas.microsoft.com/office/drawing/2014/main" id="{ED182827-550A-91F6-4E86-9F74D25FBBD6}"/>
+              </a:ext>
+            </a:extLst>
+          </p:cNvPr>
+          <p:cNvSpPr txBox="1"/>
+          <p:nvPr/>
+        </p:nvSpPr>
+        <p:spPr>
+          <a:xfrm>
+            <a:off x="3235983" y="2458687"/>
+            <a:ext cx="910962" cy="646331"/>
+          </a:xfrm>
+          <a:prstGeom prst="rect">
+            <a:avLst/>
+          </a:prstGeom>
+          <a:ln w="38100"/>
+        </p:spPr>
+        <p:style>
+          <a:lnRef idx="2">
+            <a:schemeClr val="accent2"/>
+          </a:lnRef>
+          <a:fillRef idx="1">
+            <a:schemeClr val="lt1"/>
+          </a:fillRef>
+          <a:effectRef idx="0">
+            <a:schemeClr val="accent2"/>
+          </a:effectRef>
+          <a:fontRef idx="minor">
+            <a:schemeClr val="dk1"/>
+          </a:fontRef>
+        </p:style>
+        <p:txBody>
+          <a:bodyPr wrap="square" rtlCol="0">
+            <a:spAutoFit/>
+          </a:bodyPr>
+          <a:lstStyle/>
+          <a:p>
+            <a:r>
+              <a:rPr lang="en-US" dirty="0"/>
+              <a:t>Rain on snow</a:t>
+            </a:r>
+          </a:p>
+        </p:txBody>
+      </p:sp>
+      <p:sp>
+        <p:nvSpPr>
+          <p:cNvPr id="13" name="TextBox 12">
+            <a:extLst>
+              <a:ext uri="{FF2B5EF4-FFF2-40B4-BE49-F238E27FC236}">
+                <a16:creationId xmlns:a16="http://schemas.microsoft.com/office/drawing/2014/main" id="{2D1180FD-E63F-3618-3A86-41FF1F7A7DA4}"/>
+              </a:ext>
+            </a:extLst>
+          </p:cNvPr>
+          <p:cNvSpPr txBox="1"/>
+          <p:nvPr/>
+        </p:nvSpPr>
+        <p:spPr>
+          <a:xfrm>
+            <a:off x="4972297" y="2454877"/>
+            <a:ext cx="984535" cy="646331"/>
+          </a:xfrm>
+          <a:prstGeom prst="rect">
+            <a:avLst/>
+          </a:prstGeom>
+          <a:ln w="38100"/>
+        </p:spPr>
+        <p:style>
+          <a:lnRef idx="2">
+            <a:schemeClr val="accent2"/>
+          </a:lnRef>
+          <a:fillRef idx="1">
+            <a:schemeClr val="lt1"/>
+          </a:fillRef>
+          <a:effectRef idx="0">
+            <a:schemeClr val="accent2"/>
+          </a:effectRef>
+          <a:fontRef idx="minor">
+            <a:schemeClr val="dk1"/>
+          </a:fontRef>
+        </p:style>
+        <p:txBody>
+          <a:bodyPr wrap="square" rtlCol="0">
+            <a:spAutoFit/>
+          </a:bodyPr>
+          <a:lstStyle/>
+          <a:p>
+            <a:r>
+              <a:rPr lang="en-US" dirty="0"/>
+              <a:t>Winter Severity</a:t>
+            </a:r>
+          </a:p>
+        </p:txBody>
+      </p:sp>
       <p:cxnSp>
         <p:nvCxnSpPr>
-          <p:cNvPr id="20" name="Straight Arrow Connector 19">
-            <a:extLst>
-              <a:ext uri="{FF2B5EF4-FFF2-40B4-BE49-F238E27FC236}">
-                <a16:creationId xmlns:a16="http://schemas.microsoft.com/office/drawing/2014/main" id="{69FD6086-6BC1-46E4-055C-17910D0C728A}"/>
+          <p:cNvPr id="15" name="Straight Arrow Connector 14">
+            <a:extLst>
+              <a:ext uri="{FF2B5EF4-FFF2-40B4-BE49-F238E27FC236}">
+                <a16:creationId xmlns:a16="http://schemas.microsoft.com/office/drawing/2014/main" id="{7B3AFB6C-EC4D-3064-647C-AFCC9024465E}"/>
+              </a:ext>
+            </a:extLst>
+          </p:cNvPr>
+          <p:cNvCxnSpPr>
+            <a:stCxn id="9" idx="2"/>
+            <a:endCxn id="7" idx="0"/>
+          </p:cNvCxnSpPr>
+          <p:nvPr/>
+        </p:nvCxnSpPr>
+        <p:spPr>
+          <a:xfrm>
+            <a:off x="5996741" y="1997260"/>
+            <a:ext cx="3469486" cy="1344949"/>
+          </a:xfrm>
+          <a:prstGeom prst="straightConnector1">
+            <a:avLst/>
+          </a:prstGeom>
+          <a:ln w="38100">
+            <a:solidFill>
+              <a:schemeClr val="accent6"/>
+            </a:solidFill>
+            <a:tailEnd type="triangle"/>
+          </a:ln>
+        </p:spPr>
+        <p:style>
+          <a:lnRef idx="1">
+            <a:schemeClr val="accent1"/>
+          </a:lnRef>
+          <a:fillRef idx="0">
+            <a:schemeClr val="accent1"/>
+          </a:fillRef>
+          <a:effectRef idx="0">
+            <a:schemeClr val="accent1"/>
+          </a:effectRef>
+          <a:fontRef idx="minor">
+            <a:schemeClr val="tx1"/>
+          </a:fontRef>
+        </p:style>
+      </p:cxnSp>
+      <p:cxnSp>
+        <p:nvCxnSpPr>
+          <p:cNvPr id="16" name="Straight Arrow Connector 15">
+            <a:extLst>
+              <a:ext uri="{FF2B5EF4-FFF2-40B4-BE49-F238E27FC236}">
+                <a16:creationId xmlns:a16="http://schemas.microsoft.com/office/drawing/2014/main" id="{35E73242-8458-C349-986D-50E16F1602B6}"/>
               </a:ext>
             </a:extLst>
           </p:cNvPr>
           <p:cNvCxnSpPr>
             <a:cxnSpLocks/>
-            <a:stCxn id="5" idx="2"/>
-            <a:endCxn id="6" idx="0"/>
+            <a:stCxn id="8" idx="2"/>
+            <a:endCxn id="7" idx="0"/>
           </p:cNvCxnSpPr>
           <p:nvPr/>
         </p:nvCxnSpPr>
         <p:spPr>
           <a:xfrm flipH="1">
-            <a:off x="8194053" y="4826749"/>
-            <a:ext cx="27820" cy="502414"/>
+            <a:off x="9466227" y="3090463"/>
+            <a:ext cx="1051063" cy="251746"/>
+          </a:xfrm>
+          <a:prstGeom prst="straightConnector1">
+            <a:avLst/>
+          </a:prstGeom>
+          <a:ln w="38100">
+            <a:solidFill>
+              <a:schemeClr val="accent6"/>
+            </a:solidFill>
+            <a:tailEnd type="triangle"/>
+          </a:ln>
+        </p:spPr>
+        <p:style>
+          <a:lnRef idx="1">
+            <a:schemeClr val="accent1"/>
+          </a:lnRef>
+          <a:fillRef idx="0">
+            <a:schemeClr val="accent1"/>
+          </a:fillRef>
+          <a:effectRef idx="0">
+            <a:schemeClr val="accent1"/>
+          </a:effectRef>
+          <a:fontRef idx="minor">
+            <a:schemeClr val="tx1"/>
+          </a:fontRef>
+        </p:style>
+      </p:cxnSp>
+      <p:cxnSp>
+        <p:nvCxnSpPr>
+          <p:cNvPr id="18" name="Straight Arrow Connector 17">
+            <a:extLst>
+              <a:ext uri="{FF2B5EF4-FFF2-40B4-BE49-F238E27FC236}">
+                <a16:creationId xmlns:a16="http://schemas.microsoft.com/office/drawing/2014/main" id="{0B5FE794-E23A-270F-A8FE-E6CD7F244ED7}"/>
+              </a:ext>
+            </a:extLst>
+          </p:cNvPr>
+          <p:cNvCxnSpPr>
+            <a:cxnSpLocks/>
+            <a:stCxn id="7" idx="2"/>
+            <a:endCxn id="5" idx="0"/>
+          </p:cNvCxnSpPr>
+          <p:nvPr/>
+        </p:nvCxnSpPr>
+        <p:spPr>
+          <a:xfrm flipH="1">
+            <a:off x="8221873" y="3711541"/>
+            <a:ext cx="1244354" cy="745876"/>
           </a:xfrm>
           <a:prstGeom prst="straightConnector1">
             <a:avLst/>
@@ -16017,6 +16052,53 @@
       </p:cxnSp>
       <p:cxnSp>
         <p:nvCxnSpPr>
+          <p:cNvPr id="20" name="Straight Arrow Connector 19">
+            <a:extLst>
+              <a:ext uri="{FF2B5EF4-FFF2-40B4-BE49-F238E27FC236}">
+                <a16:creationId xmlns:a16="http://schemas.microsoft.com/office/drawing/2014/main" id="{69FD6086-6BC1-46E4-055C-17910D0C728A}"/>
+              </a:ext>
+            </a:extLst>
+          </p:cNvPr>
+          <p:cNvCxnSpPr>
+            <a:cxnSpLocks/>
+            <a:stCxn id="5" idx="2"/>
+            <a:endCxn id="6" idx="0"/>
+          </p:cNvCxnSpPr>
+          <p:nvPr/>
+        </p:nvCxnSpPr>
+        <p:spPr>
+          <a:xfrm flipH="1">
+            <a:off x="8194053" y="4826749"/>
+            <a:ext cx="27820" cy="502414"/>
+          </a:xfrm>
+          <a:prstGeom prst="straightConnector1">
+            <a:avLst/>
+          </a:prstGeom>
+          <a:ln w="38100">
+            <a:solidFill>
+              <a:schemeClr val="accent6"/>
+            </a:solidFill>
+            <a:prstDash val="sysDot"/>
+            <a:tailEnd type="triangle"/>
+          </a:ln>
+        </p:spPr>
+        <p:style>
+          <a:lnRef idx="1">
+            <a:schemeClr val="accent1"/>
+          </a:lnRef>
+          <a:fillRef idx="0">
+            <a:schemeClr val="accent1"/>
+          </a:fillRef>
+          <a:effectRef idx="0">
+            <a:schemeClr val="accent1"/>
+          </a:effectRef>
+          <a:fontRef idx="minor">
+            <a:schemeClr val="tx1"/>
+          </a:fontRef>
+        </p:style>
+      </p:cxnSp>
+      <p:cxnSp>
+        <p:nvCxnSpPr>
           <p:cNvPr id="22" name="Straight Arrow Connector 21">
             <a:extLst>
               <a:ext uri="{FF2B5EF4-FFF2-40B4-BE49-F238E27FC236}">
@@ -16865,10 +16947,10 @@
       </p:cxnSp>
       <p:cxnSp>
         <p:nvCxnSpPr>
-          <p:cNvPr id="82" name="Straight Arrow Connector 81">
-            <a:extLst>
-              <a:ext uri="{FF2B5EF4-FFF2-40B4-BE49-F238E27FC236}">
-                <a16:creationId xmlns:a16="http://schemas.microsoft.com/office/drawing/2014/main" id="{EDA27C75-AD1B-CDD7-FD9B-3525B4391486}"/>
+          <p:cNvPr id="84" name="Straight Arrow Connector 83">
+            <a:extLst>
+              <a:ext uri="{FF2B5EF4-FFF2-40B4-BE49-F238E27FC236}">
+                <a16:creationId xmlns:a16="http://schemas.microsoft.com/office/drawing/2014/main" id="{06342CB9-6AC0-B9B8-AC4C-46102294496E}"/>
               </a:ext>
             </a:extLst>
           </p:cNvPr>
@@ -16880,8 +16962,8 @@
         </p:nvCxnSpPr>
         <p:spPr>
           <a:xfrm>
-            <a:off x="1258470" y="4322278"/>
-            <a:ext cx="4578780" cy="1679128"/>
+            <a:off x="2995429" y="4591181"/>
+            <a:ext cx="2841821" cy="1410225"/>
           </a:xfrm>
           <a:prstGeom prst="straightConnector1">
             <a:avLst/>
@@ -16909,52 +16991,6 @@
           </a:fontRef>
         </p:style>
       </p:cxnSp>
-      <p:cxnSp>
-        <p:nvCxnSpPr>
-          <p:cNvPr id="84" name="Straight Arrow Connector 83">
-            <a:extLst>
-              <a:ext uri="{FF2B5EF4-FFF2-40B4-BE49-F238E27FC236}">
-                <a16:creationId xmlns:a16="http://schemas.microsoft.com/office/drawing/2014/main" id="{06342CB9-6AC0-B9B8-AC4C-46102294496E}"/>
-              </a:ext>
-            </a:extLst>
-          </p:cNvPr>
-          <p:cNvCxnSpPr>
-            <a:cxnSpLocks/>
-            <a:endCxn id="4" idx="0"/>
-          </p:cNvCxnSpPr>
-          <p:nvPr/>
-        </p:nvCxnSpPr>
-        <p:spPr>
-          <a:xfrm>
-            <a:off x="2995429" y="4591181"/>
-            <a:ext cx="2841821" cy="1410225"/>
-          </a:xfrm>
-          <a:prstGeom prst="straightConnector1">
-            <a:avLst/>
-          </a:prstGeom>
-          <a:ln w="38100">
-            <a:solidFill>
-              <a:srgbClr val="FF0000"/>
-            </a:solidFill>
-            <a:prstDash val="sysDot"/>
-            <a:tailEnd type="triangle"/>
-          </a:ln>
-        </p:spPr>
-        <p:style>
-          <a:lnRef idx="1">
-            <a:schemeClr val="accent1"/>
-          </a:lnRef>
-          <a:fillRef idx="0">
-            <a:schemeClr val="accent1"/>
-          </a:fillRef>
-          <a:effectRef idx="0">
-            <a:schemeClr val="accent1"/>
-          </a:effectRef>
-          <a:fontRef idx="minor">
-            <a:schemeClr val="tx1"/>
-          </a:fontRef>
-        </p:style>
-      </p:cxnSp>
       <p:sp>
         <p:nvSpPr>
           <p:cNvPr id="88" name="TextBox 87">
@@ -17303,7 +17339,7 @@
         </p:nvSpPr>
         <p:spPr>
           <a:xfrm>
-            <a:off x="506059" y="5609767"/>
+            <a:off x="350502" y="5620979"/>
             <a:ext cx="3056949" cy="923330"/>
           </a:xfrm>
           <a:prstGeom prst="rect">
@@ -17319,7 +17355,7 @@
           <a:p>
             <a:r>
               <a:rPr lang="en-US" dirty="0"/>
-              <a:t>Analysis C: These vars will be tested against caribou demography</a:t>
+              <a:t>Analysis C: These covariates will be tested against caribou demography</a:t>
             </a:r>
           </a:p>
         </p:txBody>
@@ -17391,8 +17427,8 @@
         </p:nvSpPr>
         <p:spPr>
           <a:xfrm>
-            <a:off x="338626" y="163595"/>
-            <a:ext cx="2883259" cy="646331"/>
+            <a:off x="1405303" y="152043"/>
+            <a:ext cx="3550202" cy="369332"/>
           </a:xfrm>
           <a:prstGeom prst="rect">
             <a:avLst/>
@@ -17413,7 +17449,7 @@
                   </a:schemeClr>
                 </a:solidFill>
               </a:rPr>
-              <a:t>Analysis B: Assess directional climate change through time</a:t>
+              <a:t>Analysis B: Assess climate change</a:t>
             </a:r>
           </a:p>
         </p:txBody>
@@ -17705,6 +17741,54 @@
           </a:fontRef>
         </p:style>
       </p:cxnSp>
+      <p:sp>
+        <p:nvSpPr>
+          <p:cNvPr id="2" name="TextBox 1">
+            <a:extLst>
+              <a:ext uri="{FF2B5EF4-FFF2-40B4-BE49-F238E27FC236}">
+                <a16:creationId xmlns:a16="http://schemas.microsoft.com/office/drawing/2014/main" id="{B26D9598-BB9B-E22B-08F8-C969E257E7E5}"/>
+              </a:ext>
+            </a:extLst>
+          </p:cNvPr>
+          <p:cNvSpPr txBox="1"/>
+          <p:nvPr/>
+        </p:nvSpPr>
+        <p:spPr>
+          <a:xfrm>
+            <a:off x="124396" y="50308"/>
+            <a:ext cx="351378" cy="461665"/>
+          </a:xfrm>
+          <a:prstGeom prst="rect">
+            <a:avLst/>
+          </a:prstGeom>
+        </p:spPr>
+        <p:style>
+          <a:lnRef idx="2">
+            <a:schemeClr val="dk1"/>
+          </a:lnRef>
+          <a:fillRef idx="1">
+            <a:schemeClr val="lt1"/>
+          </a:fillRef>
+          <a:effectRef idx="0">
+            <a:schemeClr val="dk1"/>
+          </a:effectRef>
+          <a:fontRef idx="minor">
+            <a:schemeClr val="dk1"/>
+          </a:fontRef>
+        </p:style>
+        <p:txBody>
+          <a:bodyPr wrap="none" rtlCol="0">
+            <a:spAutoFit/>
+          </a:bodyPr>
+          <a:lstStyle/>
+          <a:p>
+            <a:r>
+              <a:rPr lang="en-US" sz="2400" dirty="0"/>
+              <a:t>B</a:t>
+            </a:r>
+          </a:p>
+        </p:txBody>
+      </p:sp>
     </p:spTree>
     <p:extLst>
       <p:ext uri="{BB962C8B-B14F-4D97-AF65-F5344CB8AC3E}">

</xml_diff>